<commit_message>
add more sildes Part II to PPT
</commit_message>
<xml_diff>
--- a/resource/Introduction to Binary Tree.pptx
+++ b/resource/Introduction to Binary Tree.pptx
@@ -5,10 +5,10 @@
     <p:sldMasterId id="2147483648" r:id="rId1"/>
   </p:sldMasterIdLst>
   <p:notesMasterIdLst>
-    <p:notesMasterId r:id="rId21"/>
+    <p:notesMasterId r:id="rId27"/>
   </p:notesMasterIdLst>
   <p:handoutMasterIdLst>
-    <p:handoutMasterId r:id="rId22"/>
+    <p:handoutMasterId r:id="rId28"/>
   </p:handoutMasterIdLst>
   <p:sldIdLst>
     <p:sldId id="256" r:id="rId2"/>
@@ -30,6 +30,12 @@
     <p:sldId id="273" r:id="rId18"/>
     <p:sldId id="274" r:id="rId19"/>
     <p:sldId id="275" r:id="rId20"/>
+    <p:sldId id="276" r:id="rId21"/>
+    <p:sldId id="277" r:id="rId22"/>
+    <p:sldId id="278" r:id="rId23"/>
+    <p:sldId id="279" r:id="rId24"/>
+    <p:sldId id="280" r:id="rId25"/>
+    <p:sldId id="281" r:id="rId26"/>
   </p:sldIdLst>
   <p:sldSz cx="9144000" cy="6858000" type="screen4x3"/>
   <p:notesSz cx="6858000" cy="9144000"/>
@@ -2274,6 +2280,918 @@
               <a:rPr lang="en-US" baseline="0" dirty="0" smtClean="0"/>
               <a:t> part I, I would like to explain what is a Binary Tree</a:t>
             </a:r>
+            <a:endParaRPr lang="en-US" dirty="0"/>
+          </a:p>
+        </p:txBody>
+      </p:sp>
+      <p:sp>
+        <p:nvSpPr>
+          <p:cNvPr id="5" name="Date Placeholder 4"/>
+          <p:cNvSpPr>
+            <a:spLocks noGrp="1"/>
+          </p:cNvSpPr>
+          <p:nvPr>
+            <p:ph type="dt" idx="11"/>
+          </p:nvPr>
+        </p:nvSpPr>
+        <p:spPr/>
+        <p:txBody>
+          <a:bodyPr/>
+          <a:lstStyle/>
+          <a:p>
+            <a:fld id="{8064C587-9BD5-4FA3-9B48-B80D473A78ED}" type="datetime1">
+              <a:rPr lang="en-US" smtClean="0"/>
+              <a:t>1/1/2017</a:t>
+            </a:fld>
+            <a:endParaRPr lang="en-US"/>
+          </a:p>
+        </p:txBody>
+      </p:sp>
+      <p:sp>
+        <p:nvSpPr>
+          <p:cNvPr id="6" name="Footer Placeholder 5"/>
+          <p:cNvSpPr>
+            <a:spLocks noGrp="1"/>
+          </p:cNvSpPr>
+          <p:nvPr>
+            <p:ph type="ftr" sz="quarter" idx="12"/>
+          </p:nvPr>
+        </p:nvSpPr>
+        <p:spPr/>
+        <p:txBody>
+          <a:bodyPr/>
+          <a:lstStyle/>
+          <a:p>
+            <a:r>
+              <a:rPr lang="en-US" smtClean="0"/>
+              <a:t>@copywrite Renee Wu 2016</a:t>
+            </a:r>
+            <a:endParaRPr lang="en-US"/>
+          </a:p>
+        </p:txBody>
+      </p:sp>
+      <p:sp>
+        <p:nvSpPr>
+          <p:cNvPr id="7" name="Header Placeholder 6"/>
+          <p:cNvSpPr>
+            <a:spLocks noGrp="1"/>
+          </p:cNvSpPr>
+          <p:nvPr>
+            <p:ph type="hdr" sz="quarter" idx="13"/>
+          </p:nvPr>
+        </p:nvSpPr>
+        <p:spPr/>
+        <p:txBody>
+          <a:bodyPr/>
+          <a:lstStyle/>
+          <a:p>
+            <a:r>
+              <a:rPr lang="en-US" smtClean="0"/>
+              <a:t>Part I: What is a Binary Tree</a:t>
+            </a:r>
+            <a:endParaRPr lang="en-US"/>
+          </a:p>
+        </p:txBody>
+      </p:sp>
+    </p:spTree>
+    <p:extLst>
+      <p:ext uri="{BB962C8B-B14F-4D97-AF65-F5344CB8AC3E}">
+        <p14:creationId xmlns:p14="http://schemas.microsoft.com/office/powerpoint/2010/main" val="2831876633"/>
+      </p:ext>
+    </p:extLst>
+  </p:cSld>
+  <p:clrMapOvr>
+    <a:masterClrMapping/>
+  </p:clrMapOvr>
+</p:notes>
+</file>
+
+<file path=ppt/notesSlides/notesSlide20.xml><?xml version="1.0" encoding="utf-8"?>
+<p:notes xmlns:a="http://schemas.openxmlformats.org/drawingml/2006/main" xmlns:r="http://schemas.openxmlformats.org/officeDocument/2006/relationships" xmlns:p="http://schemas.openxmlformats.org/presentationml/2006/main">
+  <p:cSld>
+    <p:spTree>
+      <p:nvGrpSpPr>
+        <p:cNvPr id="1" name=""/>
+        <p:cNvGrpSpPr/>
+        <p:nvPr/>
+      </p:nvGrpSpPr>
+      <p:grpSpPr>
+        <a:xfrm>
+          <a:off x="0" y="0"/>
+          <a:ext cx="0" cy="0"/>
+          <a:chOff x="0" y="0"/>
+          <a:chExt cx="0" cy="0"/>
+        </a:xfrm>
+      </p:grpSpPr>
+      <p:sp>
+        <p:nvSpPr>
+          <p:cNvPr id="2" name="Slide Image Placeholder 1"/>
+          <p:cNvSpPr>
+            <a:spLocks noGrp="1" noRot="1" noChangeAspect="1"/>
+          </p:cNvSpPr>
+          <p:nvPr>
+            <p:ph type="sldImg"/>
+          </p:nvPr>
+        </p:nvSpPr>
+        <p:spPr/>
+      </p:sp>
+      <p:sp>
+        <p:nvSpPr>
+          <p:cNvPr id="3" name="Notes Placeholder 2"/>
+          <p:cNvSpPr>
+            <a:spLocks noGrp="1"/>
+          </p:cNvSpPr>
+          <p:nvPr>
+            <p:ph type="body" idx="1"/>
+          </p:nvPr>
+        </p:nvSpPr>
+        <p:spPr/>
+        <p:txBody>
+          <a:bodyPr/>
+          <a:lstStyle/>
+          <a:p>
+            <a:r>
+              <a:rPr lang="en-US" dirty="0" smtClean="0"/>
+              <a:t>In</a:t>
+            </a:r>
+            <a:r>
+              <a:rPr lang="en-US" baseline="0" dirty="0" smtClean="0"/>
+              <a:t> computer science, binary search tree is a very commonly used binary tree structure. </a:t>
+            </a:r>
+          </a:p>
+          <a:p>
+            <a:r>
+              <a:rPr lang="en-US" baseline="0" dirty="0" smtClean="0"/>
+              <a:t>Besides the basic CRUD operations, BST is also good for sorting data. There are 3 way of traverse data stored in BST. </a:t>
+            </a:r>
+          </a:p>
+          <a:p>
+            <a:r>
+              <a:rPr lang="en-US" sz="1200" dirty="0" smtClean="0"/>
+              <a:t>Traversing a tree is a way of visiting each of its nodes exactly once. </a:t>
+            </a:r>
+          </a:p>
+          <a:p>
+            <a:endParaRPr lang="en-US" dirty="0"/>
+          </a:p>
+        </p:txBody>
+      </p:sp>
+      <p:sp>
+        <p:nvSpPr>
+          <p:cNvPr id="5" name="Date Placeholder 4"/>
+          <p:cNvSpPr>
+            <a:spLocks noGrp="1"/>
+          </p:cNvSpPr>
+          <p:nvPr>
+            <p:ph type="dt" idx="11"/>
+          </p:nvPr>
+        </p:nvSpPr>
+        <p:spPr/>
+        <p:txBody>
+          <a:bodyPr/>
+          <a:lstStyle/>
+          <a:p>
+            <a:fld id="{8064C587-9BD5-4FA3-9B48-B80D473A78ED}" type="datetime1">
+              <a:rPr lang="en-US" smtClean="0"/>
+              <a:t>1/1/2017</a:t>
+            </a:fld>
+            <a:endParaRPr lang="en-US"/>
+          </a:p>
+        </p:txBody>
+      </p:sp>
+      <p:sp>
+        <p:nvSpPr>
+          <p:cNvPr id="6" name="Footer Placeholder 5"/>
+          <p:cNvSpPr>
+            <a:spLocks noGrp="1"/>
+          </p:cNvSpPr>
+          <p:nvPr>
+            <p:ph type="ftr" sz="quarter" idx="12"/>
+          </p:nvPr>
+        </p:nvSpPr>
+        <p:spPr/>
+        <p:txBody>
+          <a:bodyPr/>
+          <a:lstStyle/>
+          <a:p>
+            <a:r>
+              <a:rPr lang="en-US" smtClean="0"/>
+              <a:t>@copywrite Renee Wu 2016</a:t>
+            </a:r>
+            <a:endParaRPr lang="en-US"/>
+          </a:p>
+        </p:txBody>
+      </p:sp>
+      <p:sp>
+        <p:nvSpPr>
+          <p:cNvPr id="7" name="Header Placeholder 6"/>
+          <p:cNvSpPr>
+            <a:spLocks noGrp="1"/>
+          </p:cNvSpPr>
+          <p:nvPr>
+            <p:ph type="hdr" sz="quarter" idx="13"/>
+          </p:nvPr>
+        </p:nvSpPr>
+        <p:spPr/>
+        <p:txBody>
+          <a:bodyPr/>
+          <a:lstStyle/>
+          <a:p>
+            <a:r>
+              <a:rPr lang="en-US" smtClean="0"/>
+              <a:t>Part I: What is a Binary Tree</a:t>
+            </a:r>
+            <a:endParaRPr lang="en-US"/>
+          </a:p>
+        </p:txBody>
+      </p:sp>
+    </p:spTree>
+    <p:extLst>
+      <p:ext uri="{BB962C8B-B14F-4D97-AF65-F5344CB8AC3E}">
+        <p14:creationId xmlns:p14="http://schemas.microsoft.com/office/powerpoint/2010/main" val="2831876633"/>
+      </p:ext>
+    </p:extLst>
+  </p:cSld>
+  <p:clrMapOvr>
+    <a:masterClrMapping/>
+  </p:clrMapOvr>
+</p:notes>
+</file>
+
+<file path=ppt/notesSlides/notesSlide21.xml><?xml version="1.0" encoding="utf-8"?>
+<p:notes xmlns:a="http://schemas.openxmlformats.org/drawingml/2006/main" xmlns:r="http://schemas.openxmlformats.org/officeDocument/2006/relationships" xmlns:p="http://schemas.openxmlformats.org/presentationml/2006/main">
+  <p:cSld>
+    <p:spTree>
+      <p:nvGrpSpPr>
+        <p:cNvPr id="1" name=""/>
+        <p:cNvGrpSpPr/>
+        <p:nvPr/>
+      </p:nvGrpSpPr>
+      <p:grpSpPr>
+        <a:xfrm>
+          <a:off x="0" y="0"/>
+          <a:ext cx="0" cy="0"/>
+          <a:chOff x="0" y="0"/>
+          <a:chExt cx="0" cy="0"/>
+        </a:xfrm>
+      </p:grpSpPr>
+      <p:sp>
+        <p:nvSpPr>
+          <p:cNvPr id="2" name="Slide Image Placeholder 1"/>
+          <p:cNvSpPr>
+            <a:spLocks noGrp="1" noRot="1" noChangeAspect="1"/>
+          </p:cNvSpPr>
+          <p:nvPr>
+            <p:ph type="sldImg"/>
+          </p:nvPr>
+        </p:nvSpPr>
+        <p:spPr/>
+      </p:sp>
+      <p:sp>
+        <p:nvSpPr>
+          <p:cNvPr id="3" name="Notes Placeholder 2"/>
+          <p:cNvSpPr>
+            <a:spLocks noGrp="1"/>
+          </p:cNvSpPr>
+          <p:nvPr>
+            <p:ph type="body" idx="1"/>
+          </p:nvPr>
+        </p:nvSpPr>
+        <p:spPr/>
+        <p:txBody>
+          <a:bodyPr/>
+          <a:lstStyle/>
+          <a:p>
+            <a:r>
+              <a:rPr lang="en-US" dirty="0" smtClean="0"/>
+              <a:t>In</a:t>
+            </a:r>
+            <a:r>
+              <a:rPr lang="en-US" baseline="0" dirty="0" smtClean="0"/>
+              <a:t> computer science, binary search tree is a very commonly used binary tree structure. </a:t>
+            </a:r>
+          </a:p>
+          <a:p>
+            <a:r>
+              <a:rPr lang="en-US" baseline="0" dirty="0" smtClean="0"/>
+              <a:t>Besides the basic CRUD operations, BST is also good for sorting data. There are 3 way of traverse data stored in BST. </a:t>
+            </a:r>
+          </a:p>
+          <a:p>
+            <a:r>
+              <a:rPr lang="en-US" sz="1200" dirty="0" smtClean="0"/>
+              <a:t>Traversing a tree is a way of visiting each of its nodes exactly once. </a:t>
+            </a:r>
+          </a:p>
+          <a:p>
+            <a:endParaRPr lang="en-US" dirty="0"/>
+          </a:p>
+        </p:txBody>
+      </p:sp>
+      <p:sp>
+        <p:nvSpPr>
+          <p:cNvPr id="5" name="Date Placeholder 4"/>
+          <p:cNvSpPr>
+            <a:spLocks noGrp="1"/>
+          </p:cNvSpPr>
+          <p:nvPr>
+            <p:ph type="dt" idx="11"/>
+          </p:nvPr>
+        </p:nvSpPr>
+        <p:spPr/>
+        <p:txBody>
+          <a:bodyPr/>
+          <a:lstStyle/>
+          <a:p>
+            <a:fld id="{8064C587-9BD5-4FA3-9B48-B80D473A78ED}" type="datetime1">
+              <a:rPr lang="en-US" smtClean="0"/>
+              <a:t>1/1/2017</a:t>
+            </a:fld>
+            <a:endParaRPr lang="en-US"/>
+          </a:p>
+        </p:txBody>
+      </p:sp>
+      <p:sp>
+        <p:nvSpPr>
+          <p:cNvPr id="6" name="Footer Placeholder 5"/>
+          <p:cNvSpPr>
+            <a:spLocks noGrp="1"/>
+          </p:cNvSpPr>
+          <p:nvPr>
+            <p:ph type="ftr" sz="quarter" idx="12"/>
+          </p:nvPr>
+        </p:nvSpPr>
+        <p:spPr/>
+        <p:txBody>
+          <a:bodyPr/>
+          <a:lstStyle/>
+          <a:p>
+            <a:r>
+              <a:rPr lang="en-US" smtClean="0"/>
+              <a:t>@copywrite Renee Wu 2016</a:t>
+            </a:r>
+            <a:endParaRPr lang="en-US"/>
+          </a:p>
+        </p:txBody>
+      </p:sp>
+      <p:sp>
+        <p:nvSpPr>
+          <p:cNvPr id="7" name="Header Placeholder 6"/>
+          <p:cNvSpPr>
+            <a:spLocks noGrp="1"/>
+          </p:cNvSpPr>
+          <p:nvPr>
+            <p:ph type="hdr" sz="quarter" idx="13"/>
+          </p:nvPr>
+        </p:nvSpPr>
+        <p:spPr/>
+        <p:txBody>
+          <a:bodyPr/>
+          <a:lstStyle/>
+          <a:p>
+            <a:r>
+              <a:rPr lang="en-US" smtClean="0"/>
+              <a:t>Part I: What is a Binary Tree</a:t>
+            </a:r>
+            <a:endParaRPr lang="en-US"/>
+          </a:p>
+        </p:txBody>
+      </p:sp>
+    </p:spTree>
+    <p:extLst>
+      <p:ext uri="{BB962C8B-B14F-4D97-AF65-F5344CB8AC3E}">
+        <p14:creationId xmlns:p14="http://schemas.microsoft.com/office/powerpoint/2010/main" val="2831876633"/>
+      </p:ext>
+    </p:extLst>
+  </p:cSld>
+  <p:clrMapOvr>
+    <a:masterClrMapping/>
+  </p:clrMapOvr>
+</p:notes>
+</file>
+
+<file path=ppt/notesSlides/notesSlide22.xml><?xml version="1.0" encoding="utf-8"?>
+<p:notes xmlns:a="http://schemas.openxmlformats.org/drawingml/2006/main" xmlns:r="http://schemas.openxmlformats.org/officeDocument/2006/relationships" xmlns:p="http://schemas.openxmlformats.org/presentationml/2006/main">
+  <p:cSld>
+    <p:spTree>
+      <p:nvGrpSpPr>
+        <p:cNvPr id="1" name=""/>
+        <p:cNvGrpSpPr/>
+        <p:nvPr/>
+      </p:nvGrpSpPr>
+      <p:grpSpPr>
+        <a:xfrm>
+          <a:off x="0" y="0"/>
+          <a:ext cx="0" cy="0"/>
+          <a:chOff x="0" y="0"/>
+          <a:chExt cx="0" cy="0"/>
+        </a:xfrm>
+      </p:grpSpPr>
+      <p:sp>
+        <p:nvSpPr>
+          <p:cNvPr id="2" name="Slide Image Placeholder 1"/>
+          <p:cNvSpPr>
+            <a:spLocks noGrp="1" noRot="1" noChangeAspect="1"/>
+          </p:cNvSpPr>
+          <p:nvPr>
+            <p:ph type="sldImg"/>
+          </p:nvPr>
+        </p:nvSpPr>
+        <p:spPr/>
+      </p:sp>
+      <p:sp>
+        <p:nvSpPr>
+          <p:cNvPr id="3" name="Notes Placeholder 2"/>
+          <p:cNvSpPr>
+            <a:spLocks noGrp="1"/>
+          </p:cNvSpPr>
+          <p:nvPr>
+            <p:ph type="body" idx="1"/>
+          </p:nvPr>
+        </p:nvSpPr>
+        <p:spPr/>
+        <p:txBody>
+          <a:bodyPr/>
+          <a:lstStyle/>
+          <a:p>
+            <a:r>
+              <a:rPr lang="en-US" dirty="0" smtClean="0"/>
+              <a:t>In</a:t>
+            </a:r>
+            <a:r>
+              <a:rPr lang="en-US" baseline="0" dirty="0" smtClean="0"/>
+              <a:t> computer science, binary search tree is a very commonly used binary tree structure. </a:t>
+            </a:r>
+          </a:p>
+          <a:p>
+            <a:r>
+              <a:rPr lang="en-US" baseline="0" dirty="0" smtClean="0"/>
+              <a:t>Besides the basic CRUD operations, BST is also good for sorting data. There are 3 way of traverse data stored in BST. </a:t>
+            </a:r>
+          </a:p>
+          <a:p>
+            <a:r>
+              <a:rPr lang="en-US" sz="1200" dirty="0" smtClean="0"/>
+              <a:t>Traversing a tree is a way of visiting each of its nodes exactly once. </a:t>
+            </a:r>
+          </a:p>
+          <a:p>
+            <a:endParaRPr lang="en-US" dirty="0"/>
+          </a:p>
+        </p:txBody>
+      </p:sp>
+      <p:sp>
+        <p:nvSpPr>
+          <p:cNvPr id="5" name="Date Placeholder 4"/>
+          <p:cNvSpPr>
+            <a:spLocks noGrp="1"/>
+          </p:cNvSpPr>
+          <p:nvPr>
+            <p:ph type="dt" idx="11"/>
+          </p:nvPr>
+        </p:nvSpPr>
+        <p:spPr/>
+        <p:txBody>
+          <a:bodyPr/>
+          <a:lstStyle/>
+          <a:p>
+            <a:fld id="{8064C587-9BD5-4FA3-9B48-B80D473A78ED}" type="datetime1">
+              <a:rPr lang="en-US" smtClean="0"/>
+              <a:t>1/1/2017</a:t>
+            </a:fld>
+            <a:endParaRPr lang="en-US"/>
+          </a:p>
+        </p:txBody>
+      </p:sp>
+      <p:sp>
+        <p:nvSpPr>
+          <p:cNvPr id="6" name="Footer Placeholder 5"/>
+          <p:cNvSpPr>
+            <a:spLocks noGrp="1"/>
+          </p:cNvSpPr>
+          <p:nvPr>
+            <p:ph type="ftr" sz="quarter" idx="12"/>
+          </p:nvPr>
+        </p:nvSpPr>
+        <p:spPr/>
+        <p:txBody>
+          <a:bodyPr/>
+          <a:lstStyle/>
+          <a:p>
+            <a:r>
+              <a:rPr lang="en-US" smtClean="0"/>
+              <a:t>@copywrite Renee Wu 2016</a:t>
+            </a:r>
+            <a:endParaRPr lang="en-US"/>
+          </a:p>
+        </p:txBody>
+      </p:sp>
+      <p:sp>
+        <p:nvSpPr>
+          <p:cNvPr id="7" name="Header Placeholder 6"/>
+          <p:cNvSpPr>
+            <a:spLocks noGrp="1"/>
+          </p:cNvSpPr>
+          <p:nvPr>
+            <p:ph type="hdr" sz="quarter" idx="13"/>
+          </p:nvPr>
+        </p:nvSpPr>
+        <p:spPr/>
+        <p:txBody>
+          <a:bodyPr/>
+          <a:lstStyle/>
+          <a:p>
+            <a:r>
+              <a:rPr lang="en-US" smtClean="0"/>
+              <a:t>Part I: What is a Binary Tree</a:t>
+            </a:r>
+            <a:endParaRPr lang="en-US"/>
+          </a:p>
+        </p:txBody>
+      </p:sp>
+    </p:spTree>
+    <p:extLst>
+      <p:ext uri="{BB962C8B-B14F-4D97-AF65-F5344CB8AC3E}">
+        <p14:creationId xmlns:p14="http://schemas.microsoft.com/office/powerpoint/2010/main" val="2831876633"/>
+      </p:ext>
+    </p:extLst>
+  </p:cSld>
+  <p:clrMapOvr>
+    <a:masterClrMapping/>
+  </p:clrMapOvr>
+</p:notes>
+</file>
+
+<file path=ppt/notesSlides/notesSlide23.xml><?xml version="1.0" encoding="utf-8"?>
+<p:notes xmlns:a="http://schemas.openxmlformats.org/drawingml/2006/main" xmlns:r="http://schemas.openxmlformats.org/officeDocument/2006/relationships" xmlns:p="http://schemas.openxmlformats.org/presentationml/2006/main">
+  <p:cSld>
+    <p:spTree>
+      <p:nvGrpSpPr>
+        <p:cNvPr id="1" name=""/>
+        <p:cNvGrpSpPr/>
+        <p:nvPr/>
+      </p:nvGrpSpPr>
+      <p:grpSpPr>
+        <a:xfrm>
+          <a:off x="0" y="0"/>
+          <a:ext cx="0" cy="0"/>
+          <a:chOff x="0" y="0"/>
+          <a:chExt cx="0" cy="0"/>
+        </a:xfrm>
+      </p:grpSpPr>
+      <p:sp>
+        <p:nvSpPr>
+          <p:cNvPr id="2" name="Slide Image Placeholder 1"/>
+          <p:cNvSpPr>
+            <a:spLocks noGrp="1" noRot="1" noChangeAspect="1"/>
+          </p:cNvSpPr>
+          <p:nvPr>
+            <p:ph type="sldImg"/>
+          </p:nvPr>
+        </p:nvSpPr>
+        <p:spPr/>
+      </p:sp>
+      <p:sp>
+        <p:nvSpPr>
+          <p:cNvPr id="3" name="Notes Placeholder 2"/>
+          <p:cNvSpPr>
+            <a:spLocks noGrp="1"/>
+          </p:cNvSpPr>
+          <p:nvPr>
+            <p:ph type="body" idx="1"/>
+          </p:nvPr>
+        </p:nvSpPr>
+        <p:spPr/>
+        <p:txBody>
+          <a:bodyPr/>
+          <a:lstStyle/>
+          <a:p>
+            <a:r>
+              <a:rPr lang="en-US" dirty="0" smtClean="0"/>
+              <a:t>In</a:t>
+            </a:r>
+            <a:r>
+              <a:rPr lang="en-US" baseline="0" dirty="0" smtClean="0"/>
+              <a:t> computer science, binary search tree is a very commonly used binary tree structure. </a:t>
+            </a:r>
+          </a:p>
+          <a:p>
+            <a:r>
+              <a:rPr lang="en-US" baseline="0" dirty="0" smtClean="0"/>
+              <a:t>Besides the basic CRUD operations, BST is also good for sorting data. There are 3 way of traverse data stored in BST. </a:t>
+            </a:r>
+          </a:p>
+          <a:p>
+            <a:r>
+              <a:rPr lang="en-US" sz="1200" dirty="0" smtClean="0"/>
+              <a:t>Traversing a tree is a way of visiting each of its nodes exactly once. </a:t>
+            </a:r>
+          </a:p>
+          <a:p>
+            <a:endParaRPr lang="en-US" dirty="0"/>
+          </a:p>
+        </p:txBody>
+      </p:sp>
+      <p:sp>
+        <p:nvSpPr>
+          <p:cNvPr id="5" name="Date Placeholder 4"/>
+          <p:cNvSpPr>
+            <a:spLocks noGrp="1"/>
+          </p:cNvSpPr>
+          <p:nvPr>
+            <p:ph type="dt" idx="11"/>
+          </p:nvPr>
+        </p:nvSpPr>
+        <p:spPr/>
+        <p:txBody>
+          <a:bodyPr/>
+          <a:lstStyle/>
+          <a:p>
+            <a:fld id="{8064C587-9BD5-4FA3-9B48-B80D473A78ED}" type="datetime1">
+              <a:rPr lang="en-US" smtClean="0"/>
+              <a:t>1/1/2017</a:t>
+            </a:fld>
+            <a:endParaRPr lang="en-US"/>
+          </a:p>
+        </p:txBody>
+      </p:sp>
+      <p:sp>
+        <p:nvSpPr>
+          <p:cNvPr id="6" name="Footer Placeholder 5"/>
+          <p:cNvSpPr>
+            <a:spLocks noGrp="1"/>
+          </p:cNvSpPr>
+          <p:nvPr>
+            <p:ph type="ftr" sz="quarter" idx="12"/>
+          </p:nvPr>
+        </p:nvSpPr>
+        <p:spPr/>
+        <p:txBody>
+          <a:bodyPr/>
+          <a:lstStyle/>
+          <a:p>
+            <a:r>
+              <a:rPr lang="en-US" smtClean="0"/>
+              <a:t>@copywrite Renee Wu 2016</a:t>
+            </a:r>
+            <a:endParaRPr lang="en-US"/>
+          </a:p>
+        </p:txBody>
+      </p:sp>
+      <p:sp>
+        <p:nvSpPr>
+          <p:cNvPr id="7" name="Header Placeholder 6"/>
+          <p:cNvSpPr>
+            <a:spLocks noGrp="1"/>
+          </p:cNvSpPr>
+          <p:nvPr>
+            <p:ph type="hdr" sz="quarter" idx="13"/>
+          </p:nvPr>
+        </p:nvSpPr>
+        <p:spPr/>
+        <p:txBody>
+          <a:bodyPr/>
+          <a:lstStyle/>
+          <a:p>
+            <a:r>
+              <a:rPr lang="en-US" smtClean="0"/>
+              <a:t>Part I: What is a Binary Tree</a:t>
+            </a:r>
+            <a:endParaRPr lang="en-US"/>
+          </a:p>
+        </p:txBody>
+      </p:sp>
+    </p:spTree>
+    <p:extLst>
+      <p:ext uri="{BB962C8B-B14F-4D97-AF65-F5344CB8AC3E}">
+        <p14:creationId xmlns:p14="http://schemas.microsoft.com/office/powerpoint/2010/main" val="2831876633"/>
+      </p:ext>
+    </p:extLst>
+  </p:cSld>
+  <p:clrMapOvr>
+    <a:masterClrMapping/>
+  </p:clrMapOvr>
+</p:notes>
+</file>
+
+<file path=ppt/notesSlides/notesSlide24.xml><?xml version="1.0" encoding="utf-8"?>
+<p:notes xmlns:a="http://schemas.openxmlformats.org/drawingml/2006/main" xmlns:r="http://schemas.openxmlformats.org/officeDocument/2006/relationships" xmlns:p="http://schemas.openxmlformats.org/presentationml/2006/main">
+  <p:cSld>
+    <p:spTree>
+      <p:nvGrpSpPr>
+        <p:cNvPr id="1" name=""/>
+        <p:cNvGrpSpPr/>
+        <p:nvPr/>
+      </p:nvGrpSpPr>
+      <p:grpSpPr>
+        <a:xfrm>
+          <a:off x="0" y="0"/>
+          <a:ext cx="0" cy="0"/>
+          <a:chOff x="0" y="0"/>
+          <a:chExt cx="0" cy="0"/>
+        </a:xfrm>
+      </p:grpSpPr>
+      <p:sp>
+        <p:nvSpPr>
+          <p:cNvPr id="2" name="Slide Image Placeholder 1"/>
+          <p:cNvSpPr>
+            <a:spLocks noGrp="1" noRot="1" noChangeAspect="1"/>
+          </p:cNvSpPr>
+          <p:nvPr>
+            <p:ph type="sldImg"/>
+          </p:nvPr>
+        </p:nvSpPr>
+        <p:spPr/>
+      </p:sp>
+      <p:sp>
+        <p:nvSpPr>
+          <p:cNvPr id="3" name="Notes Placeholder 2"/>
+          <p:cNvSpPr>
+            <a:spLocks noGrp="1"/>
+          </p:cNvSpPr>
+          <p:nvPr>
+            <p:ph type="body" idx="1"/>
+          </p:nvPr>
+        </p:nvSpPr>
+        <p:spPr/>
+        <p:txBody>
+          <a:bodyPr/>
+          <a:lstStyle/>
+          <a:p>
+            <a:r>
+              <a:rPr lang="en-US" dirty="0" smtClean="0"/>
+              <a:t>In</a:t>
+            </a:r>
+            <a:r>
+              <a:rPr lang="en-US" baseline="0" dirty="0" smtClean="0"/>
+              <a:t> computer science, binary search tree is a very commonly used binary tree structure. </a:t>
+            </a:r>
+          </a:p>
+          <a:p>
+            <a:r>
+              <a:rPr lang="en-US" baseline="0" dirty="0" smtClean="0"/>
+              <a:t>Besides the basic CRUD operations, BST is also good for sorting data. There are 3 way of traverse data stored in BST. </a:t>
+            </a:r>
+          </a:p>
+          <a:p>
+            <a:r>
+              <a:rPr lang="en-US" sz="1200" dirty="0" smtClean="0"/>
+              <a:t>Traversing a tree is a way of visiting each of its nodes exactly once. </a:t>
+            </a:r>
+          </a:p>
+          <a:p>
+            <a:endParaRPr lang="en-US" dirty="0"/>
+          </a:p>
+        </p:txBody>
+      </p:sp>
+      <p:sp>
+        <p:nvSpPr>
+          <p:cNvPr id="5" name="Date Placeholder 4"/>
+          <p:cNvSpPr>
+            <a:spLocks noGrp="1"/>
+          </p:cNvSpPr>
+          <p:nvPr>
+            <p:ph type="dt" idx="11"/>
+          </p:nvPr>
+        </p:nvSpPr>
+        <p:spPr/>
+        <p:txBody>
+          <a:bodyPr/>
+          <a:lstStyle/>
+          <a:p>
+            <a:fld id="{8064C587-9BD5-4FA3-9B48-B80D473A78ED}" type="datetime1">
+              <a:rPr lang="en-US" smtClean="0"/>
+              <a:t>1/1/2017</a:t>
+            </a:fld>
+            <a:endParaRPr lang="en-US"/>
+          </a:p>
+        </p:txBody>
+      </p:sp>
+      <p:sp>
+        <p:nvSpPr>
+          <p:cNvPr id="6" name="Footer Placeholder 5"/>
+          <p:cNvSpPr>
+            <a:spLocks noGrp="1"/>
+          </p:cNvSpPr>
+          <p:nvPr>
+            <p:ph type="ftr" sz="quarter" idx="12"/>
+          </p:nvPr>
+        </p:nvSpPr>
+        <p:spPr/>
+        <p:txBody>
+          <a:bodyPr/>
+          <a:lstStyle/>
+          <a:p>
+            <a:r>
+              <a:rPr lang="en-US" smtClean="0"/>
+              <a:t>@copywrite Renee Wu 2016</a:t>
+            </a:r>
+            <a:endParaRPr lang="en-US"/>
+          </a:p>
+        </p:txBody>
+      </p:sp>
+      <p:sp>
+        <p:nvSpPr>
+          <p:cNvPr id="7" name="Header Placeholder 6"/>
+          <p:cNvSpPr>
+            <a:spLocks noGrp="1"/>
+          </p:cNvSpPr>
+          <p:nvPr>
+            <p:ph type="hdr" sz="quarter" idx="13"/>
+          </p:nvPr>
+        </p:nvSpPr>
+        <p:spPr/>
+        <p:txBody>
+          <a:bodyPr/>
+          <a:lstStyle/>
+          <a:p>
+            <a:r>
+              <a:rPr lang="en-US" smtClean="0"/>
+              <a:t>Part I: What is a Binary Tree</a:t>
+            </a:r>
+            <a:endParaRPr lang="en-US"/>
+          </a:p>
+        </p:txBody>
+      </p:sp>
+    </p:spTree>
+    <p:extLst>
+      <p:ext uri="{BB962C8B-B14F-4D97-AF65-F5344CB8AC3E}">
+        <p14:creationId xmlns:p14="http://schemas.microsoft.com/office/powerpoint/2010/main" val="2831876633"/>
+      </p:ext>
+    </p:extLst>
+  </p:cSld>
+  <p:clrMapOvr>
+    <a:masterClrMapping/>
+  </p:clrMapOvr>
+</p:notes>
+</file>
+
+<file path=ppt/notesSlides/notesSlide25.xml><?xml version="1.0" encoding="utf-8"?>
+<p:notes xmlns:a="http://schemas.openxmlformats.org/drawingml/2006/main" xmlns:r="http://schemas.openxmlformats.org/officeDocument/2006/relationships" xmlns:p="http://schemas.openxmlformats.org/presentationml/2006/main">
+  <p:cSld>
+    <p:spTree>
+      <p:nvGrpSpPr>
+        <p:cNvPr id="1" name=""/>
+        <p:cNvGrpSpPr/>
+        <p:nvPr/>
+      </p:nvGrpSpPr>
+      <p:grpSpPr>
+        <a:xfrm>
+          <a:off x="0" y="0"/>
+          <a:ext cx="0" cy="0"/>
+          <a:chOff x="0" y="0"/>
+          <a:chExt cx="0" cy="0"/>
+        </a:xfrm>
+      </p:grpSpPr>
+      <p:sp>
+        <p:nvSpPr>
+          <p:cNvPr id="2" name="Slide Image Placeholder 1"/>
+          <p:cNvSpPr>
+            <a:spLocks noGrp="1" noRot="1" noChangeAspect="1"/>
+          </p:cNvSpPr>
+          <p:nvPr>
+            <p:ph type="sldImg"/>
+          </p:nvPr>
+        </p:nvSpPr>
+        <p:spPr/>
+      </p:sp>
+      <p:sp>
+        <p:nvSpPr>
+          <p:cNvPr id="3" name="Notes Placeholder 2"/>
+          <p:cNvSpPr>
+            <a:spLocks noGrp="1"/>
+          </p:cNvSpPr>
+          <p:nvPr>
+            <p:ph type="body" idx="1"/>
+          </p:nvPr>
+        </p:nvSpPr>
+        <p:spPr/>
+        <p:txBody>
+          <a:bodyPr/>
+          <a:lstStyle/>
+          <a:p>
+            <a:r>
+              <a:rPr lang="en-US" dirty="0" smtClean="0"/>
+              <a:t>In</a:t>
+            </a:r>
+            <a:r>
+              <a:rPr lang="en-US" baseline="0" dirty="0" smtClean="0"/>
+              <a:t> computer science, binary search tree is a very commonly used binary tree structure. </a:t>
+            </a:r>
+          </a:p>
+          <a:p>
+            <a:r>
+              <a:rPr lang="en-US" baseline="0" dirty="0" smtClean="0"/>
+              <a:t>Besides the basic CRUD operations, BST is also good for sorting data. There are 3 way of traverse data stored in BST. </a:t>
+            </a:r>
+          </a:p>
+          <a:p>
+            <a:r>
+              <a:rPr lang="en-US" sz="1200" dirty="0" smtClean="0"/>
+              <a:t>Traversing a tree is a way of visiting each of its nodes exactly once. </a:t>
+            </a:r>
+          </a:p>
+          <a:p>
             <a:endParaRPr lang="en-US" dirty="0"/>
           </a:p>
         </p:txBody>
@@ -6513,7 +7431,9 @@
             <a:r>
               <a:rPr lang="en-US" dirty="0">
                 <a:solidFill>
-                  <a:prstClr val="black"/>
+                  <a:schemeClr val="accent3">
+                    <a:lumMod val="50000"/>
+                  </a:schemeClr>
                 </a:solidFill>
               </a:rPr>
               <a:t>Part </a:t>
@@ -6521,14 +7441,18 @@
             <a:r>
               <a:rPr lang="en-US" dirty="0" smtClean="0">
                 <a:solidFill>
-                  <a:prstClr val="black"/>
+                  <a:schemeClr val="accent3">
+                    <a:lumMod val="50000"/>
+                  </a:schemeClr>
                 </a:solidFill>
               </a:rPr>
               <a:t>I: What is a Binary Tree</a:t>
             </a:r>
             <a:endParaRPr lang="en-US" dirty="0">
               <a:solidFill>
-                <a:prstClr val="black"/>
+                <a:schemeClr val="accent3">
+                  <a:lumMod val="50000"/>
+                </a:schemeClr>
               </a:solidFill>
             </a:endParaRPr>
           </a:p>
@@ -6557,8 +7481,18 @@
           <a:lstStyle/>
           <a:p>
             <a:r>
+              <a:rPr lang="en-US" dirty="0" smtClean="0">
+                <a:solidFill>
+                  <a:schemeClr val="accent3">
+                    <a:lumMod val="50000"/>
+                  </a:schemeClr>
+                </a:solidFill>
+              </a:rPr>
+              <a:t>A Binary Tree is first of all a TREE</a:t>
+            </a:r>
+            <a:r>
               <a:rPr lang="en-US" dirty="0" smtClean="0"/>
-              <a:t>A Binary Tree is first of all a TREE </a:t>
+              <a:t> </a:t>
             </a:r>
             <a:endParaRPr lang="en-US" dirty="0"/>
           </a:p>
@@ -6924,7 +7858,9 @@
             <a:r>
               <a:rPr lang="en-US" dirty="0">
                 <a:solidFill>
-                  <a:prstClr val="black"/>
+                  <a:schemeClr val="accent3">
+                    <a:lumMod val="50000"/>
+                  </a:schemeClr>
                 </a:solidFill>
               </a:rPr>
               <a:t>Part </a:t>
@@ -6932,14 +7868,18 @@
             <a:r>
               <a:rPr lang="en-US" dirty="0" smtClean="0">
                 <a:solidFill>
-                  <a:prstClr val="black"/>
+                  <a:schemeClr val="accent3">
+                    <a:lumMod val="50000"/>
+                  </a:schemeClr>
                 </a:solidFill>
               </a:rPr>
               <a:t>I: What is a Binary Tree</a:t>
             </a:r>
             <a:endParaRPr lang="en-US" dirty="0">
               <a:solidFill>
-                <a:prstClr val="black"/>
+                <a:schemeClr val="accent3">
+                  <a:lumMod val="50000"/>
+                </a:schemeClr>
               </a:solidFill>
             </a:endParaRPr>
           </a:p>
@@ -6968,10 +7908,22 @@
           <a:lstStyle/>
           <a:p>
             <a:r>
-              <a:rPr lang="en-US" dirty="0" smtClean="0"/>
+              <a:rPr lang="en-US" dirty="0" smtClean="0">
+                <a:solidFill>
+                  <a:schemeClr val="accent3">
+                    <a:lumMod val="50000"/>
+                  </a:schemeClr>
+                </a:solidFill>
+              </a:rPr>
               <a:t>A Binary Tree is BINARY</a:t>
             </a:r>
-            <a:endParaRPr lang="en-US" dirty="0"/>
+            <a:endParaRPr lang="en-US" dirty="0">
+              <a:solidFill>
+                <a:schemeClr val="accent3">
+                  <a:lumMod val="50000"/>
+                </a:schemeClr>
+              </a:solidFill>
+            </a:endParaRPr>
           </a:p>
         </p:txBody>
       </p:sp>
@@ -7171,7 +8123,9 @@
             <a:r>
               <a:rPr lang="en-US" dirty="0">
                 <a:solidFill>
-                  <a:prstClr val="black"/>
+                  <a:schemeClr val="accent3">
+                    <a:lumMod val="50000"/>
+                  </a:schemeClr>
                 </a:solidFill>
               </a:rPr>
               <a:t>Part </a:t>
@@ -7179,14 +8133,18 @@
             <a:r>
               <a:rPr lang="en-US" dirty="0" smtClean="0">
                 <a:solidFill>
-                  <a:prstClr val="black"/>
+                  <a:schemeClr val="accent3">
+                    <a:lumMod val="50000"/>
+                  </a:schemeClr>
                 </a:solidFill>
               </a:rPr>
               <a:t>I: What is a Binary Tree</a:t>
             </a:r>
             <a:endParaRPr lang="en-US" dirty="0">
               <a:solidFill>
-                <a:prstClr val="black"/>
+                <a:schemeClr val="accent3">
+                  <a:lumMod val="50000"/>
+                </a:schemeClr>
               </a:solidFill>
             </a:endParaRPr>
           </a:p>
@@ -7215,7 +8173,13 @@
           <a:lstStyle/>
           <a:p>
             <a:r>
-              <a:rPr lang="en-US" dirty="0" smtClean="0"/>
+              <a:rPr lang="en-US" dirty="0" smtClean="0">
+                <a:solidFill>
+                  <a:schemeClr val="accent3">
+                    <a:lumMod val="50000"/>
+                  </a:schemeClr>
+                </a:solidFill>
+              </a:rPr>
               <a:t>A Binary Tree is BINARY, meaning:</a:t>
             </a:r>
           </a:p>
@@ -7334,7 +8298,9 @@
             <a:r>
               <a:rPr lang="en-US" dirty="0">
                 <a:solidFill>
-                  <a:prstClr val="black"/>
+                  <a:schemeClr val="accent3">
+                    <a:lumMod val="50000"/>
+                  </a:schemeClr>
                 </a:solidFill>
               </a:rPr>
               <a:t>Part </a:t>
@@ -7342,14 +8308,18 @@
             <a:r>
               <a:rPr lang="en-US" dirty="0" smtClean="0">
                 <a:solidFill>
-                  <a:prstClr val="black"/>
+                  <a:schemeClr val="accent3">
+                    <a:lumMod val="50000"/>
+                  </a:schemeClr>
                 </a:solidFill>
               </a:rPr>
               <a:t>I: What is a Binary Tree</a:t>
             </a:r>
             <a:endParaRPr lang="en-US" dirty="0">
               <a:solidFill>
-                <a:prstClr val="black"/>
+                <a:schemeClr val="accent3">
+                  <a:lumMod val="50000"/>
+                </a:schemeClr>
               </a:solidFill>
             </a:endParaRPr>
           </a:p>
@@ -7378,7 +8348,13 @@
           <a:lstStyle/>
           <a:p>
             <a:r>
-              <a:rPr lang="en-US" dirty="0" smtClean="0"/>
+              <a:rPr lang="en-US" dirty="0" smtClean="0">
+                <a:solidFill>
+                  <a:schemeClr val="accent3">
+                    <a:lumMod val="50000"/>
+                  </a:schemeClr>
+                </a:solidFill>
+              </a:rPr>
               <a:t>A Binary Tree is BINARY, meaning:</a:t>
             </a:r>
           </a:p>
@@ -7551,7 +8527,9 @@
             <a:r>
               <a:rPr lang="en-US" dirty="0">
                 <a:solidFill>
-                  <a:prstClr val="black"/>
+                  <a:schemeClr val="accent3">
+                    <a:lumMod val="50000"/>
+                  </a:schemeClr>
                 </a:solidFill>
               </a:rPr>
               <a:t>Part </a:t>
@@ -7559,14 +8537,18 @@
             <a:r>
               <a:rPr lang="en-US" dirty="0" smtClean="0">
                 <a:solidFill>
-                  <a:prstClr val="black"/>
+                  <a:schemeClr val="accent3">
+                    <a:lumMod val="50000"/>
+                  </a:schemeClr>
                 </a:solidFill>
               </a:rPr>
               <a:t>I: What is a Binary Tree</a:t>
             </a:r>
             <a:endParaRPr lang="en-US" dirty="0">
               <a:solidFill>
-                <a:prstClr val="black"/>
+                <a:schemeClr val="accent3">
+                  <a:lumMod val="50000"/>
+                </a:schemeClr>
               </a:solidFill>
             </a:endParaRPr>
           </a:p>
@@ -7595,7 +8577,13 @@
           <a:lstStyle/>
           <a:p>
             <a:r>
-              <a:rPr lang="en-US" dirty="0" smtClean="0"/>
+              <a:rPr lang="en-US" dirty="0" smtClean="0">
+                <a:solidFill>
+                  <a:schemeClr val="accent3">
+                    <a:lumMod val="50000"/>
+                  </a:schemeClr>
+                </a:solidFill>
+              </a:rPr>
               <a:t>A Binary Tree is BINARY, meaning:</a:t>
             </a:r>
           </a:p>
@@ -8082,7 +9070,7 @@
         </p:blipFill>
         <p:spPr bwMode="auto">
           <a:xfrm>
-            <a:off x="2624577" y="4653136"/>
+            <a:off x="2645216" y="4509120"/>
             <a:ext cx="3848100" cy="1962150"/>
           </a:xfrm>
           <a:prstGeom prst="rect">
@@ -9455,7 +10443,7 @@
         <p:spPr>
           <a:xfrm>
             <a:off x="1308267" y="796062"/>
-            <a:ext cx="6480720" cy="3816429"/>
+            <a:ext cx="6480720" cy="4801314"/>
           </a:xfrm>
           <a:prstGeom prst="rect">
             <a:avLst/>
@@ -9487,6 +10475,9 @@
             </a:r>
           </a:p>
           <a:p>
+            <a:endParaRPr lang="en-US" sz="1600" dirty="0" smtClean="0"/>
+          </a:p>
+          <a:p>
             <a:pPr marL="285750" indent="-285750">
               <a:buFont typeface="Arial" panose="020B0604020202020204" pitchFamily="34" charset="0"/>
               <a:buChar char="•"/>
@@ -9497,6 +10488,13 @@
             </a:r>
           </a:p>
           <a:p>
+            <a:pPr marL="285750" indent="-285750">
+              <a:buFont typeface="Arial" panose="020B0604020202020204" pitchFamily="34" charset="0"/>
+              <a:buChar char="•"/>
+            </a:pPr>
+            <a:endParaRPr lang="en-US" sz="1600" dirty="0" smtClean="0"/>
+          </a:p>
+          <a:p>
             <a:pPr marL="742950" lvl="1" indent="-285750">
               <a:buFont typeface="Courier New" panose="02070309020205020404" pitchFamily="49" charset="0"/>
               <a:buChar char="o"/>
@@ -9537,6 +10535,13 @@
             </a:r>
           </a:p>
           <a:p>
+            <a:pPr marL="742950" lvl="1" indent="-285750">
+              <a:buFont typeface="Courier New" panose="02070309020205020404" pitchFamily="49" charset="0"/>
+              <a:buChar char="o"/>
+            </a:pPr>
+            <a:endParaRPr lang="en-US" sz="1600" dirty="0" smtClean="0"/>
+          </a:p>
+          <a:p>
             <a:pPr marL="285750" indent="-285750">
               <a:buFont typeface="Arial" panose="020B0604020202020204" pitchFamily="34" charset="0"/>
               <a:buChar char="•"/>
@@ -9549,6 +10554,13 @@
               <a:rPr lang="en-US" sz="1600" dirty="0" smtClean="0"/>
               <a:t>ch Tree is such a binary tree that </a:t>
             </a:r>
+          </a:p>
+          <a:p>
+            <a:pPr marL="285750" indent="-285750">
+              <a:buFont typeface="Arial" panose="020B0604020202020204" pitchFamily="34" charset="0"/>
+              <a:buChar char="•"/>
+            </a:pPr>
+            <a:endParaRPr lang="en-US" sz="1600" dirty="0" smtClean="0"/>
           </a:p>
           <a:p>
             <a:pPr marL="742950" lvl="1" indent="-285750">
@@ -9843,6 +10855,1321 @@
     <p:extLst>
       <p:ext uri="{BB962C8B-B14F-4D97-AF65-F5344CB8AC3E}">
         <p14:creationId xmlns:p14="http://schemas.microsoft.com/office/powerpoint/2010/main" val="1625775342"/>
+      </p:ext>
+    </p:extLst>
+  </p:cSld>
+  <p:clrMapOvr>
+    <a:masterClrMapping/>
+  </p:clrMapOvr>
+  <p:timing>
+    <p:tnLst>
+      <p:par>
+        <p:cTn id="1" dur="indefinite" restart="never" nodeType="tmRoot"/>
+      </p:par>
+    </p:tnLst>
+  </p:timing>
+</p:sld>
+</file>
+
+<file path=ppt/slides/slide20.xml><?xml version="1.0" encoding="utf-8"?>
+<p:sld xmlns:a="http://schemas.openxmlformats.org/drawingml/2006/main" xmlns:r="http://schemas.openxmlformats.org/officeDocument/2006/relationships" xmlns:p="http://schemas.openxmlformats.org/presentationml/2006/main">
+  <p:cSld>
+    <p:spTree>
+      <p:nvGrpSpPr>
+        <p:cNvPr id="1" name=""/>
+        <p:cNvGrpSpPr/>
+        <p:nvPr/>
+      </p:nvGrpSpPr>
+      <p:grpSpPr>
+        <a:xfrm>
+          <a:off x="0" y="0"/>
+          <a:ext cx="0" cy="0"/>
+          <a:chOff x="0" y="0"/>
+          <a:chExt cx="0" cy="0"/>
+        </a:xfrm>
+      </p:grpSpPr>
+      <p:sp>
+        <p:nvSpPr>
+          <p:cNvPr id="4" name="Date Placeholder 3"/>
+          <p:cNvSpPr>
+            <a:spLocks noGrp="1"/>
+          </p:cNvSpPr>
+          <p:nvPr>
+            <p:ph type="dt" sz="half" idx="10"/>
+          </p:nvPr>
+        </p:nvSpPr>
+        <p:spPr/>
+        <p:txBody>
+          <a:bodyPr/>
+          <a:lstStyle/>
+          <a:p>
+            <a:r>
+              <a:rPr lang="en-US" smtClean="0"/>
+              <a:t>12/28/2016</a:t>
+            </a:r>
+            <a:endParaRPr lang="en-US"/>
+          </a:p>
+        </p:txBody>
+      </p:sp>
+      <p:sp>
+        <p:nvSpPr>
+          <p:cNvPr id="2" name="Rectangle 1"/>
+          <p:cNvSpPr/>
+          <p:nvPr/>
+        </p:nvSpPr>
+        <p:spPr>
+          <a:xfrm>
+            <a:off x="467544" y="332656"/>
+            <a:ext cx="3960440" cy="369332"/>
+          </a:xfrm>
+          <a:prstGeom prst="rect">
+            <a:avLst/>
+          </a:prstGeom>
+        </p:spPr>
+        <p:txBody>
+          <a:bodyPr wrap="square">
+            <a:spAutoFit/>
+          </a:bodyPr>
+          <a:lstStyle/>
+          <a:p>
+            <a:pPr marL="285750" lvl="0" indent="-285750">
+              <a:buFont typeface="Arial" panose="020B0604020202020204" pitchFamily="34" charset="0"/>
+              <a:buChar char="•"/>
+            </a:pPr>
+            <a:r>
+              <a:rPr lang="en-US" dirty="0">
+                <a:solidFill>
+                  <a:schemeClr val="accent3">
+                    <a:lumMod val="50000"/>
+                  </a:schemeClr>
+                </a:solidFill>
+              </a:rPr>
+              <a:t>Part </a:t>
+            </a:r>
+            <a:r>
+              <a:rPr lang="en-US" dirty="0">
+                <a:solidFill>
+                  <a:schemeClr val="accent3">
+                    <a:lumMod val="50000"/>
+                  </a:schemeClr>
+                </a:solidFill>
+              </a:rPr>
+              <a:t>II: A Binary Tree Implementation</a:t>
+            </a:r>
+            <a:endParaRPr lang="en-US" dirty="0">
+              <a:solidFill>
+                <a:schemeClr val="accent3">
+                  <a:lumMod val="50000"/>
+                </a:schemeClr>
+              </a:solidFill>
+            </a:endParaRPr>
+          </a:p>
+        </p:txBody>
+      </p:sp>
+      <p:sp>
+        <p:nvSpPr>
+          <p:cNvPr id="3" name="TextBox 2"/>
+          <p:cNvSpPr txBox="1"/>
+          <p:nvPr/>
+        </p:nvSpPr>
+        <p:spPr>
+          <a:xfrm>
+            <a:off x="1308267" y="796062"/>
+            <a:ext cx="6480720" cy="2431435"/>
+          </a:xfrm>
+          <a:prstGeom prst="rect">
+            <a:avLst/>
+          </a:prstGeom>
+          <a:noFill/>
+        </p:spPr>
+        <p:txBody>
+          <a:bodyPr wrap="square" rtlCol="0">
+            <a:spAutoFit/>
+          </a:bodyPr>
+          <a:lstStyle/>
+          <a:p>
+            <a:pPr marL="285750" indent="-285750">
+              <a:buFont typeface="Arial" panose="020B0604020202020204" pitchFamily="34" charset="0"/>
+              <a:buChar char="•"/>
+            </a:pPr>
+            <a:r>
+              <a:rPr lang="en-US" sz="1600" dirty="0" smtClean="0"/>
+              <a:t>Java Project</a:t>
+            </a:r>
+          </a:p>
+          <a:p>
+            <a:pPr marL="285750" indent="-285750">
+              <a:buFont typeface="Arial" panose="020B0604020202020204" pitchFamily="34" charset="0"/>
+              <a:buChar char="•"/>
+            </a:pPr>
+            <a:r>
+              <a:rPr lang="en-US" sz="1600" dirty="0" err="1" smtClean="0"/>
+              <a:t>IntelliJ</a:t>
+            </a:r>
+            <a:r>
+              <a:rPr lang="en-US" sz="1600" dirty="0" smtClean="0"/>
+              <a:t> IDEA 2016.3 Community Edition</a:t>
+            </a:r>
+          </a:p>
+          <a:p>
+            <a:pPr marL="285750" indent="-285750">
+              <a:buFont typeface="Arial" panose="020B0604020202020204" pitchFamily="34" charset="0"/>
+              <a:buChar char="•"/>
+            </a:pPr>
+            <a:r>
+              <a:rPr lang="en-US" sz="1600" dirty="0" smtClean="0"/>
+              <a:t>Maven Project</a:t>
+            </a:r>
+          </a:p>
+          <a:p>
+            <a:pPr marL="285750" indent="-285750">
+              <a:buFont typeface="Arial" panose="020B0604020202020204" pitchFamily="34" charset="0"/>
+              <a:buChar char="•"/>
+            </a:pPr>
+            <a:r>
+              <a:rPr lang="en-US" sz="1600" dirty="0" smtClean="0"/>
+              <a:t>TDD approach</a:t>
+            </a:r>
+          </a:p>
+          <a:p>
+            <a:pPr marL="285750" indent="-285750">
+              <a:buFont typeface="Arial" panose="020B0604020202020204" pitchFamily="34" charset="0"/>
+              <a:buChar char="•"/>
+            </a:pPr>
+            <a:r>
+              <a:rPr lang="en-US" sz="1600" dirty="0" err="1" smtClean="0"/>
+              <a:t>GitHub</a:t>
+            </a:r>
+            <a:endParaRPr lang="en-US" sz="1600" dirty="0" smtClean="0"/>
+          </a:p>
+          <a:p>
+            <a:pPr marL="742950" lvl="1" indent="-285750">
+              <a:buFont typeface="Courier New" panose="02070309020205020404" pitchFamily="49" charset="0"/>
+              <a:buChar char="o"/>
+            </a:pPr>
+            <a:r>
+              <a:rPr lang="en-US" dirty="0" smtClean="0">
+                <a:hlinkClick r:id="rId3"/>
+              </a:rPr>
+              <a:t>https</a:t>
+            </a:r>
+            <a:r>
+              <a:rPr lang="en-US" dirty="0">
+                <a:hlinkClick r:id="rId3"/>
+              </a:rPr>
+              <a:t>://</a:t>
+            </a:r>
+            <a:r>
+              <a:rPr lang="en-US" dirty="0" smtClean="0">
+                <a:hlinkClick r:id="rId3"/>
+              </a:rPr>
+              <a:t>github.com/renee2016/wilfrid</a:t>
+            </a:r>
+            <a:endParaRPr lang="en-US" dirty="0" smtClean="0"/>
+          </a:p>
+          <a:p>
+            <a:endParaRPr lang="en-US" dirty="0"/>
+          </a:p>
+          <a:p>
+            <a:endParaRPr lang="en-US" dirty="0" smtClean="0"/>
+          </a:p>
+          <a:p>
+            <a:endParaRPr lang="en-US" dirty="0" smtClean="0"/>
+          </a:p>
+        </p:txBody>
+      </p:sp>
+      <p:pic>
+        <p:nvPicPr>
+          <p:cNvPr id="1026" name="Picture 2"/>
+          <p:cNvPicPr>
+            <a:picLocks noChangeAspect="1" noChangeArrowheads="1"/>
+          </p:cNvPicPr>
+          <p:nvPr/>
+        </p:nvPicPr>
+        <p:blipFill>
+          <a:blip r:embed="rId4">
+            <a:extLst>
+              <a:ext uri="{28A0092B-C50C-407E-A947-70E740481C1C}">
+                <a14:useLocalDpi xmlns:a14="http://schemas.microsoft.com/office/drawing/2010/main" val="0"/>
+              </a:ext>
+            </a:extLst>
+          </a:blip>
+          <a:srcRect/>
+          <a:stretch>
+            <a:fillRect/>
+          </a:stretch>
+        </p:blipFill>
+        <p:spPr bwMode="auto">
+          <a:xfrm>
+            <a:off x="1364543" y="2420888"/>
+            <a:ext cx="6362700" cy="3876675"/>
+          </a:xfrm>
+          <a:prstGeom prst="rect">
+            <a:avLst/>
+          </a:prstGeom>
+          <a:noFill/>
+          <a:ln>
+            <a:noFill/>
+          </a:ln>
+          <a:extLst>
+            <a:ext uri="{909E8E84-426E-40DD-AFC4-6F175D3DCCD1}">
+              <a14:hiddenFill xmlns:a14="http://schemas.microsoft.com/office/drawing/2010/main">
+                <a:solidFill>
+                  <a:schemeClr val="accent1"/>
+                </a:solidFill>
+              </a14:hiddenFill>
+            </a:ext>
+            <a:ext uri="{91240B29-F687-4F45-9708-019B960494DF}">
+              <a14:hiddenLine xmlns:a14="http://schemas.microsoft.com/office/drawing/2010/main" w="9525">
+                <a:solidFill>
+                  <a:schemeClr val="tx1"/>
+                </a:solidFill>
+                <a:miter lim="800000"/>
+                <a:headEnd/>
+                <a:tailEnd/>
+              </a14:hiddenLine>
+            </a:ext>
+          </a:extLst>
+        </p:spPr>
+      </p:pic>
+    </p:spTree>
+    <p:extLst>
+      <p:ext uri="{BB962C8B-B14F-4D97-AF65-F5344CB8AC3E}">
+        <p14:creationId xmlns:p14="http://schemas.microsoft.com/office/powerpoint/2010/main" val="2137997609"/>
+      </p:ext>
+    </p:extLst>
+  </p:cSld>
+  <p:clrMapOvr>
+    <a:masterClrMapping/>
+  </p:clrMapOvr>
+  <p:timing>
+    <p:tnLst>
+      <p:par>
+        <p:cTn id="1" dur="indefinite" restart="never" nodeType="tmRoot"/>
+      </p:par>
+    </p:tnLst>
+  </p:timing>
+</p:sld>
+</file>
+
+<file path=ppt/slides/slide21.xml><?xml version="1.0" encoding="utf-8"?>
+<p:sld xmlns:a="http://schemas.openxmlformats.org/drawingml/2006/main" xmlns:r="http://schemas.openxmlformats.org/officeDocument/2006/relationships" xmlns:p="http://schemas.openxmlformats.org/presentationml/2006/main">
+  <p:cSld>
+    <p:spTree>
+      <p:nvGrpSpPr>
+        <p:cNvPr id="1" name=""/>
+        <p:cNvGrpSpPr/>
+        <p:nvPr/>
+      </p:nvGrpSpPr>
+      <p:grpSpPr>
+        <a:xfrm>
+          <a:off x="0" y="0"/>
+          <a:ext cx="0" cy="0"/>
+          <a:chOff x="0" y="0"/>
+          <a:chExt cx="0" cy="0"/>
+        </a:xfrm>
+      </p:grpSpPr>
+      <p:sp>
+        <p:nvSpPr>
+          <p:cNvPr id="4" name="Date Placeholder 3"/>
+          <p:cNvSpPr>
+            <a:spLocks noGrp="1"/>
+          </p:cNvSpPr>
+          <p:nvPr>
+            <p:ph type="dt" sz="half" idx="10"/>
+          </p:nvPr>
+        </p:nvSpPr>
+        <p:spPr/>
+        <p:txBody>
+          <a:bodyPr/>
+          <a:lstStyle/>
+          <a:p>
+            <a:r>
+              <a:rPr lang="en-US" smtClean="0"/>
+              <a:t>12/28/2016</a:t>
+            </a:r>
+            <a:endParaRPr lang="en-US"/>
+          </a:p>
+        </p:txBody>
+      </p:sp>
+      <p:sp>
+        <p:nvSpPr>
+          <p:cNvPr id="2" name="Rectangle 1"/>
+          <p:cNvSpPr/>
+          <p:nvPr/>
+        </p:nvSpPr>
+        <p:spPr>
+          <a:xfrm>
+            <a:off x="467544" y="332656"/>
+            <a:ext cx="3960440" cy="369332"/>
+          </a:xfrm>
+          <a:prstGeom prst="rect">
+            <a:avLst/>
+          </a:prstGeom>
+        </p:spPr>
+        <p:txBody>
+          <a:bodyPr wrap="square">
+            <a:spAutoFit/>
+          </a:bodyPr>
+          <a:lstStyle/>
+          <a:p>
+            <a:pPr marL="285750" lvl="0" indent="-285750">
+              <a:buFont typeface="Arial" panose="020B0604020202020204" pitchFamily="34" charset="0"/>
+              <a:buChar char="•"/>
+            </a:pPr>
+            <a:r>
+              <a:rPr lang="en-US" dirty="0">
+                <a:solidFill>
+                  <a:schemeClr val="accent3">
+                    <a:lumMod val="50000"/>
+                  </a:schemeClr>
+                </a:solidFill>
+              </a:rPr>
+              <a:t>Part </a:t>
+            </a:r>
+            <a:r>
+              <a:rPr lang="en-US" dirty="0">
+                <a:solidFill>
+                  <a:schemeClr val="accent3">
+                    <a:lumMod val="50000"/>
+                  </a:schemeClr>
+                </a:solidFill>
+              </a:rPr>
+              <a:t>II: A Binary Tree Implementation</a:t>
+            </a:r>
+            <a:endParaRPr lang="en-US" dirty="0">
+              <a:solidFill>
+                <a:schemeClr val="accent3">
+                  <a:lumMod val="50000"/>
+                </a:schemeClr>
+              </a:solidFill>
+            </a:endParaRPr>
+          </a:p>
+        </p:txBody>
+      </p:sp>
+      <p:pic>
+        <p:nvPicPr>
+          <p:cNvPr id="2051" name="Picture 3"/>
+          <p:cNvPicPr>
+            <a:picLocks noChangeAspect="1" noChangeArrowheads="1"/>
+          </p:cNvPicPr>
+          <p:nvPr/>
+        </p:nvPicPr>
+        <p:blipFill>
+          <a:blip r:embed="rId3">
+            <a:extLst>
+              <a:ext uri="{28A0092B-C50C-407E-A947-70E740481C1C}">
+                <a14:useLocalDpi xmlns:a14="http://schemas.microsoft.com/office/drawing/2010/main" val="0"/>
+              </a:ext>
+            </a:extLst>
+          </a:blip>
+          <a:srcRect/>
+          <a:stretch>
+            <a:fillRect/>
+          </a:stretch>
+        </p:blipFill>
+        <p:spPr bwMode="auto">
+          <a:xfrm>
+            <a:off x="933515" y="727353"/>
+            <a:ext cx="7272808" cy="5966898"/>
+          </a:xfrm>
+          <a:prstGeom prst="rect">
+            <a:avLst/>
+          </a:prstGeom>
+          <a:noFill/>
+          <a:ln>
+            <a:noFill/>
+          </a:ln>
+          <a:extLst>
+            <a:ext uri="{909E8E84-426E-40DD-AFC4-6F175D3DCCD1}">
+              <a14:hiddenFill xmlns:a14="http://schemas.microsoft.com/office/drawing/2010/main">
+                <a:solidFill>
+                  <a:schemeClr val="accent1"/>
+                </a:solidFill>
+              </a14:hiddenFill>
+            </a:ext>
+            <a:ext uri="{91240B29-F687-4F45-9708-019B960494DF}">
+              <a14:hiddenLine xmlns:a14="http://schemas.microsoft.com/office/drawing/2010/main" w="9525">
+                <a:solidFill>
+                  <a:schemeClr val="tx1"/>
+                </a:solidFill>
+                <a:miter lim="800000"/>
+                <a:headEnd/>
+                <a:tailEnd/>
+              </a14:hiddenLine>
+            </a:ext>
+          </a:extLst>
+        </p:spPr>
+      </p:pic>
+    </p:spTree>
+    <p:extLst>
+      <p:ext uri="{BB962C8B-B14F-4D97-AF65-F5344CB8AC3E}">
+        <p14:creationId xmlns:p14="http://schemas.microsoft.com/office/powerpoint/2010/main" val="45789931"/>
+      </p:ext>
+    </p:extLst>
+  </p:cSld>
+  <p:clrMapOvr>
+    <a:masterClrMapping/>
+  </p:clrMapOvr>
+  <p:timing>
+    <p:tnLst>
+      <p:par>
+        <p:cTn id="1" dur="indefinite" restart="never" nodeType="tmRoot"/>
+      </p:par>
+    </p:tnLst>
+  </p:timing>
+</p:sld>
+</file>
+
+<file path=ppt/slides/slide22.xml><?xml version="1.0" encoding="utf-8"?>
+<p:sld xmlns:a="http://schemas.openxmlformats.org/drawingml/2006/main" xmlns:r="http://schemas.openxmlformats.org/officeDocument/2006/relationships" xmlns:p="http://schemas.openxmlformats.org/presentationml/2006/main">
+  <p:cSld>
+    <p:spTree>
+      <p:nvGrpSpPr>
+        <p:cNvPr id="1" name=""/>
+        <p:cNvGrpSpPr/>
+        <p:nvPr/>
+      </p:nvGrpSpPr>
+      <p:grpSpPr>
+        <a:xfrm>
+          <a:off x="0" y="0"/>
+          <a:ext cx="0" cy="0"/>
+          <a:chOff x="0" y="0"/>
+          <a:chExt cx="0" cy="0"/>
+        </a:xfrm>
+      </p:grpSpPr>
+      <p:sp>
+        <p:nvSpPr>
+          <p:cNvPr id="4" name="Date Placeholder 3"/>
+          <p:cNvSpPr>
+            <a:spLocks noGrp="1"/>
+          </p:cNvSpPr>
+          <p:nvPr>
+            <p:ph type="dt" sz="half" idx="10"/>
+          </p:nvPr>
+        </p:nvSpPr>
+        <p:spPr/>
+        <p:txBody>
+          <a:bodyPr/>
+          <a:lstStyle/>
+          <a:p>
+            <a:r>
+              <a:rPr lang="en-US" smtClean="0"/>
+              <a:t>12/28/2016</a:t>
+            </a:r>
+            <a:endParaRPr lang="en-US"/>
+          </a:p>
+        </p:txBody>
+      </p:sp>
+      <p:sp>
+        <p:nvSpPr>
+          <p:cNvPr id="2" name="Rectangle 1"/>
+          <p:cNvSpPr/>
+          <p:nvPr/>
+        </p:nvSpPr>
+        <p:spPr>
+          <a:xfrm>
+            <a:off x="467544" y="332656"/>
+            <a:ext cx="3960440" cy="369332"/>
+          </a:xfrm>
+          <a:prstGeom prst="rect">
+            <a:avLst/>
+          </a:prstGeom>
+        </p:spPr>
+        <p:txBody>
+          <a:bodyPr wrap="square">
+            <a:spAutoFit/>
+          </a:bodyPr>
+          <a:lstStyle/>
+          <a:p>
+            <a:pPr marL="285750" lvl="0" indent="-285750">
+              <a:buFont typeface="Arial" panose="020B0604020202020204" pitchFamily="34" charset="0"/>
+              <a:buChar char="•"/>
+            </a:pPr>
+            <a:r>
+              <a:rPr lang="en-US" dirty="0">
+                <a:solidFill>
+                  <a:schemeClr val="accent3">
+                    <a:lumMod val="50000"/>
+                  </a:schemeClr>
+                </a:solidFill>
+              </a:rPr>
+              <a:t>Part </a:t>
+            </a:r>
+            <a:r>
+              <a:rPr lang="en-US" dirty="0">
+                <a:solidFill>
+                  <a:schemeClr val="accent3">
+                    <a:lumMod val="50000"/>
+                  </a:schemeClr>
+                </a:solidFill>
+              </a:rPr>
+              <a:t>II: A Binary Tree Implementation</a:t>
+            </a:r>
+            <a:endParaRPr lang="en-US" dirty="0">
+              <a:solidFill>
+                <a:schemeClr val="accent3">
+                  <a:lumMod val="50000"/>
+                </a:schemeClr>
+              </a:solidFill>
+            </a:endParaRPr>
+          </a:p>
+        </p:txBody>
+      </p:sp>
+      <p:pic>
+        <p:nvPicPr>
+          <p:cNvPr id="3076" name="Picture 4"/>
+          <p:cNvPicPr>
+            <a:picLocks noChangeAspect="1" noChangeArrowheads="1"/>
+          </p:cNvPicPr>
+          <p:nvPr/>
+        </p:nvPicPr>
+        <p:blipFill>
+          <a:blip r:embed="rId3">
+            <a:extLst>
+              <a:ext uri="{28A0092B-C50C-407E-A947-70E740481C1C}">
+                <a14:useLocalDpi xmlns:a14="http://schemas.microsoft.com/office/drawing/2010/main" val="0"/>
+              </a:ext>
+            </a:extLst>
+          </a:blip>
+          <a:srcRect/>
+          <a:stretch>
+            <a:fillRect/>
+          </a:stretch>
+        </p:blipFill>
+        <p:spPr bwMode="auto">
+          <a:xfrm>
+            <a:off x="553894" y="836712"/>
+            <a:ext cx="7800975" cy="5610225"/>
+          </a:xfrm>
+          <a:prstGeom prst="rect">
+            <a:avLst/>
+          </a:prstGeom>
+          <a:noFill/>
+          <a:ln>
+            <a:noFill/>
+          </a:ln>
+          <a:extLst>
+            <a:ext uri="{909E8E84-426E-40DD-AFC4-6F175D3DCCD1}">
+              <a14:hiddenFill xmlns:a14="http://schemas.microsoft.com/office/drawing/2010/main">
+                <a:solidFill>
+                  <a:schemeClr val="accent1"/>
+                </a:solidFill>
+              </a14:hiddenFill>
+            </a:ext>
+            <a:ext uri="{91240B29-F687-4F45-9708-019B960494DF}">
+              <a14:hiddenLine xmlns:a14="http://schemas.microsoft.com/office/drawing/2010/main" w="9525">
+                <a:solidFill>
+                  <a:schemeClr val="tx1"/>
+                </a:solidFill>
+                <a:miter lim="800000"/>
+                <a:headEnd/>
+                <a:tailEnd/>
+              </a14:hiddenLine>
+            </a:ext>
+          </a:extLst>
+        </p:spPr>
+      </p:pic>
+      <p:pic>
+        <p:nvPicPr>
+          <p:cNvPr id="3079" name="Picture 7"/>
+          <p:cNvPicPr>
+            <a:picLocks noChangeAspect="1" noChangeArrowheads="1"/>
+          </p:cNvPicPr>
+          <p:nvPr/>
+        </p:nvPicPr>
+        <p:blipFill>
+          <a:blip r:embed="rId4">
+            <a:extLst>
+              <a:ext uri="{28A0092B-C50C-407E-A947-70E740481C1C}">
+                <a14:useLocalDpi xmlns:a14="http://schemas.microsoft.com/office/drawing/2010/main" val="0"/>
+              </a:ext>
+            </a:extLst>
+          </a:blip>
+          <a:srcRect/>
+          <a:stretch>
+            <a:fillRect/>
+          </a:stretch>
+        </p:blipFill>
+        <p:spPr bwMode="auto">
+          <a:xfrm>
+            <a:off x="6012160" y="3933056"/>
+            <a:ext cx="2124075" cy="1943100"/>
+          </a:xfrm>
+          <a:prstGeom prst="rect">
+            <a:avLst/>
+          </a:prstGeom>
+          <a:noFill/>
+          <a:ln>
+            <a:noFill/>
+          </a:ln>
+          <a:extLst>
+            <a:ext uri="{909E8E84-426E-40DD-AFC4-6F175D3DCCD1}">
+              <a14:hiddenFill xmlns:a14="http://schemas.microsoft.com/office/drawing/2010/main">
+                <a:solidFill>
+                  <a:schemeClr val="accent1"/>
+                </a:solidFill>
+              </a14:hiddenFill>
+            </a:ext>
+            <a:ext uri="{91240B29-F687-4F45-9708-019B960494DF}">
+              <a14:hiddenLine xmlns:a14="http://schemas.microsoft.com/office/drawing/2010/main" w="9525">
+                <a:solidFill>
+                  <a:schemeClr val="tx1"/>
+                </a:solidFill>
+                <a:miter lim="800000"/>
+                <a:headEnd/>
+                <a:tailEnd/>
+              </a14:hiddenLine>
+            </a:ext>
+          </a:extLst>
+        </p:spPr>
+      </p:pic>
+    </p:spTree>
+    <p:extLst>
+      <p:ext uri="{BB962C8B-B14F-4D97-AF65-F5344CB8AC3E}">
+        <p14:creationId xmlns:p14="http://schemas.microsoft.com/office/powerpoint/2010/main" val="3399015474"/>
+      </p:ext>
+    </p:extLst>
+  </p:cSld>
+  <p:clrMapOvr>
+    <a:masterClrMapping/>
+  </p:clrMapOvr>
+  <p:timing>
+    <p:tnLst>
+      <p:par>
+        <p:cTn id="1" dur="indefinite" restart="never" nodeType="tmRoot"/>
+      </p:par>
+    </p:tnLst>
+  </p:timing>
+</p:sld>
+</file>
+
+<file path=ppt/slides/slide23.xml><?xml version="1.0" encoding="utf-8"?>
+<p:sld xmlns:a="http://schemas.openxmlformats.org/drawingml/2006/main" xmlns:r="http://schemas.openxmlformats.org/officeDocument/2006/relationships" xmlns:p="http://schemas.openxmlformats.org/presentationml/2006/main">
+  <p:cSld>
+    <p:spTree>
+      <p:nvGrpSpPr>
+        <p:cNvPr id="1" name=""/>
+        <p:cNvGrpSpPr/>
+        <p:nvPr/>
+      </p:nvGrpSpPr>
+      <p:grpSpPr>
+        <a:xfrm>
+          <a:off x="0" y="0"/>
+          <a:ext cx="0" cy="0"/>
+          <a:chOff x="0" y="0"/>
+          <a:chExt cx="0" cy="0"/>
+        </a:xfrm>
+      </p:grpSpPr>
+      <p:pic>
+        <p:nvPicPr>
+          <p:cNvPr id="4104" name="Picture 8"/>
+          <p:cNvPicPr>
+            <a:picLocks noChangeAspect="1" noChangeArrowheads="1"/>
+          </p:cNvPicPr>
+          <p:nvPr/>
+        </p:nvPicPr>
+        <p:blipFill>
+          <a:blip r:embed="rId3">
+            <a:extLst>
+              <a:ext uri="{28A0092B-C50C-407E-A947-70E740481C1C}">
+                <a14:useLocalDpi xmlns:a14="http://schemas.microsoft.com/office/drawing/2010/main" val="0"/>
+              </a:ext>
+            </a:extLst>
+          </a:blip>
+          <a:srcRect/>
+          <a:stretch>
+            <a:fillRect/>
+          </a:stretch>
+        </p:blipFill>
+        <p:spPr bwMode="auto">
+          <a:xfrm>
+            <a:off x="251520" y="737313"/>
+            <a:ext cx="6595607" cy="5917112"/>
+          </a:xfrm>
+          <a:prstGeom prst="rect">
+            <a:avLst/>
+          </a:prstGeom>
+          <a:noFill/>
+          <a:ln>
+            <a:noFill/>
+          </a:ln>
+          <a:extLst>
+            <a:ext uri="{909E8E84-426E-40DD-AFC4-6F175D3DCCD1}">
+              <a14:hiddenFill xmlns:a14="http://schemas.microsoft.com/office/drawing/2010/main">
+                <a:solidFill>
+                  <a:schemeClr val="accent1"/>
+                </a:solidFill>
+              </a14:hiddenFill>
+            </a:ext>
+            <a:ext uri="{91240B29-F687-4F45-9708-019B960494DF}">
+              <a14:hiddenLine xmlns:a14="http://schemas.microsoft.com/office/drawing/2010/main" w="9525">
+                <a:solidFill>
+                  <a:schemeClr val="tx1"/>
+                </a:solidFill>
+                <a:miter lim="800000"/>
+                <a:headEnd/>
+                <a:tailEnd/>
+              </a14:hiddenLine>
+            </a:ext>
+          </a:extLst>
+        </p:spPr>
+      </p:pic>
+      <p:sp>
+        <p:nvSpPr>
+          <p:cNvPr id="4" name="Date Placeholder 3"/>
+          <p:cNvSpPr>
+            <a:spLocks noGrp="1"/>
+          </p:cNvSpPr>
+          <p:nvPr>
+            <p:ph type="dt" sz="half" idx="10"/>
+          </p:nvPr>
+        </p:nvSpPr>
+        <p:spPr/>
+        <p:txBody>
+          <a:bodyPr/>
+          <a:lstStyle/>
+          <a:p>
+            <a:r>
+              <a:rPr lang="en-US" smtClean="0"/>
+              <a:t>12/28/2016</a:t>
+            </a:r>
+            <a:endParaRPr lang="en-US"/>
+          </a:p>
+        </p:txBody>
+      </p:sp>
+      <p:sp>
+        <p:nvSpPr>
+          <p:cNvPr id="2" name="Rectangle 1"/>
+          <p:cNvSpPr/>
+          <p:nvPr/>
+        </p:nvSpPr>
+        <p:spPr>
+          <a:xfrm>
+            <a:off x="467544" y="332656"/>
+            <a:ext cx="3960440" cy="369332"/>
+          </a:xfrm>
+          <a:prstGeom prst="rect">
+            <a:avLst/>
+          </a:prstGeom>
+        </p:spPr>
+        <p:txBody>
+          <a:bodyPr wrap="square">
+            <a:spAutoFit/>
+          </a:bodyPr>
+          <a:lstStyle/>
+          <a:p>
+            <a:pPr marL="285750" lvl="0" indent="-285750">
+              <a:buFont typeface="Arial" panose="020B0604020202020204" pitchFamily="34" charset="0"/>
+              <a:buChar char="•"/>
+            </a:pPr>
+            <a:r>
+              <a:rPr lang="en-US" dirty="0">
+                <a:solidFill>
+                  <a:schemeClr val="accent3">
+                    <a:lumMod val="50000"/>
+                  </a:schemeClr>
+                </a:solidFill>
+              </a:rPr>
+              <a:t>Part </a:t>
+            </a:r>
+            <a:r>
+              <a:rPr lang="en-US" dirty="0">
+                <a:solidFill>
+                  <a:schemeClr val="accent3">
+                    <a:lumMod val="50000"/>
+                  </a:schemeClr>
+                </a:solidFill>
+              </a:rPr>
+              <a:t>II: A Binary Tree Implementation</a:t>
+            </a:r>
+            <a:endParaRPr lang="en-US" dirty="0">
+              <a:solidFill>
+                <a:schemeClr val="accent3">
+                  <a:lumMod val="50000"/>
+                </a:schemeClr>
+              </a:solidFill>
+            </a:endParaRPr>
+          </a:p>
+        </p:txBody>
+      </p:sp>
+      <p:pic>
+        <p:nvPicPr>
+          <p:cNvPr id="4100" name="Picture 4"/>
+          <p:cNvPicPr>
+            <a:picLocks noChangeAspect="1" noChangeArrowheads="1"/>
+          </p:cNvPicPr>
+          <p:nvPr/>
+        </p:nvPicPr>
+        <p:blipFill>
+          <a:blip r:embed="rId4">
+            <a:extLst>
+              <a:ext uri="{28A0092B-C50C-407E-A947-70E740481C1C}">
+                <a14:useLocalDpi xmlns:a14="http://schemas.microsoft.com/office/drawing/2010/main" val="0"/>
+              </a:ext>
+            </a:extLst>
+          </a:blip>
+          <a:srcRect/>
+          <a:stretch>
+            <a:fillRect/>
+          </a:stretch>
+        </p:blipFill>
+        <p:spPr bwMode="auto">
+          <a:xfrm>
+            <a:off x="5761390" y="701988"/>
+            <a:ext cx="1876797" cy="2145950"/>
+          </a:xfrm>
+          <a:prstGeom prst="rect">
+            <a:avLst/>
+          </a:prstGeom>
+          <a:noFill/>
+          <a:ln>
+            <a:noFill/>
+          </a:ln>
+          <a:extLst>
+            <a:ext uri="{909E8E84-426E-40DD-AFC4-6F175D3DCCD1}">
+              <a14:hiddenFill xmlns:a14="http://schemas.microsoft.com/office/drawing/2010/main">
+                <a:solidFill>
+                  <a:schemeClr val="accent1"/>
+                </a:solidFill>
+              </a14:hiddenFill>
+            </a:ext>
+            <a:ext uri="{91240B29-F687-4F45-9708-019B960494DF}">
+              <a14:hiddenLine xmlns:a14="http://schemas.microsoft.com/office/drawing/2010/main" w="9525">
+                <a:solidFill>
+                  <a:schemeClr val="tx1"/>
+                </a:solidFill>
+                <a:miter lim="800000"/>
+                <a:headEnd/>
+                <a:tailEnd/>
+              </a14:hiddenLine>
+            </a:ext>
+          </a:extLst>
+        </p:spPr>
+      </p:pic>
+      <p:pic>
+        <p:nvPicPr>
+          <p:cNvPr id="4101" name="Picture 5"/>
+          <p:cNvPicPr>
+            <a:picLocks noChangeAspect="1" noChangeArrowheads="1"/>
+          </p:cNvPicPr>
+          <p:nvPr/>
+        </p:nvPicPr>
+        <p:blipFill>
+          <a:blip r:embed="rId5">
+            <a:extLst>
+              <a:ext uri="{28A0092B-C50C-407E-A947-70E740481C1C}">
+                <a14:useLocalDpi xmlns:a14="http://schemas.microsoft.com/office/drawing/2010/main" val="0"/>
+              </a:ext>
+            </a:extLst>
+          </a:blip>
+          <a:srcRect/>
+          <a:stretch>
+            <a:fillRect/>
+          </a:stretch>
+        </p:blipFill>
+        <p:spPr bwMode="auto">
+          <a:xfrm>
+            <a:off x="4211960" y="2420888"/>
+            <a:ext cx="1757611" cy="2189810"/>
+          </a:xfrm>
+          <a:prstGeom prst="rect">
+            <a:avLst/>
+          </a:prstGeom>
+          <a:noFill/>
+          <a:ln>
+            <a:noFill/>
+          </a:ln>
+          <a:extLst>
+            <a:ext uri="{909E8E84-426E-40DD-AFC4-6F175D3DCCD1}">
+              <a14:hiddenFill xmlns:a14="http://schemas.microsoft.com/office/drawing/2010/main">
+                <a:solidFill>
+                  <a:schemeClr val="accent1"/>
+                </a:solidFill>
+              </a14:hiddenFill>
+            </a:ext>
+            <a:ext uri="{91240B29-F687-4F45-9708-019B960494DF}">
+              <a14:hiddenLine xmlns:a14="http://schemas.microsoft.com/office/drawing/2010/main" w="9525">
+                <a:solidFill>
+                  <a:schemeClr val="tx1"/>
+                </a:solidFill>
+                <a:miter lim="800000"/>
+                <a:headEnd/>
+                <a:tailEnd/>
+              </a14:hiddenLine>
+            </a:ext>
+          </a:extLst>
+        </p:spPr>
+      </p:pic>
+      <p:pic>
+        <p:nvPicPr>
+          <p:cNvPr id="4102" name="Picture 6"/>
+          <p:cNvPicPr>
+            <a:picLocks noChangeAspect="1" noChangeArrowheads="1"/>
+          </p:cNvPicPr>
+          <p:nvPr/>
+        </p:nvPicPr>
+        <p:blipFill>
+          <a:blip r:embed="rId6">
+            <a:extLst>
+              <a:ext uri="{28A0092B-C50C-407E-A947-70E740481C1C}">
+                <a14:useLocalDpi xmlns:a14="http://schemas.microsoft.com/office/drawing/2010/main" val="0"/>
+              </a:ext>
+            </a:extLst>
+          </a:blip>
+          <a:srcRect/>
+          <a:stretch>
+            <a:fillRect/>
+          </a:stretch>
+        </p:blipFill>
+        <p:spPr bwMode="auto">
+          <a:xfrm>
+            <a:off x="6444208" y="3028462"/>
+            <a:ext cx="2152097" cy="2117801"/>
+          </a:xfrm>
+          <a:prstGeom prst="rect">
+            <a:avLst/>
+          </a:prstGeom>
+          <a:noFill/>
+          <a:ln>
+            <a:noFill/>
+          </a:ln>
+          <a:extLst>
+            <a:ext uri="{909E8E84-426E-40DD-AFC4-6F175D3DCCD1}">
+              <a14:hiddenFill xmlns:a14="http://schemas.microsoft.com/office/drawing/2010/main">
+                <a:solidFill>
+                  <a:schemeClr val="accent1"/>
+                </a:solidFill>
+              </a14:hiddenFill>
+            </a:ext>
+            <a:ext uri="{91240B29-F687-4F45-9708-019B960494DF}">
+              <a14:hiddenLine xmlns:a14="http://schemas.microsoft.com/office/drawing/2010/main" w="9525">
+                <a:solidFill>
+                  <a:schemeClr val="tx1"/>
+                </a:solidFill>
+                <a:miter lim="800000"/>
+                <a:headEnd/>
+                <a:tailEnd/>
+              </a14:hiddenLine>
+            </a:ext>
+          </a:extLst>
+        </p:spPr>
+      </p:pic>
+    </p:spTree>
+    <p:extLst>
+      <p:ext uri="{BB962C8B-B14F-4D97-AF65-F5344CB8AC3E}">
+        <p14:creationId xmlns:p14="http://schemas.microsoft.com/office/powerpoint/2010/main" val="1301127710"/>
+      </p:ext>
+    </p:extLst>
+  </p:cSld>
+  <p:clrMapOvr>
+    <a:masterClrMapping/>
+  </p:clrMapOvr>
+  <p:timing>
+    <p:tnLst>
+      <p:par>
+        <p:cTn id="1" dur="indefinite" restart="never" nodeType="tmRoot"/>
+      </p:par>
+    </p:tnLst>
+  </p:timing>
+</p:sld>
+</file>
+
+<file path=ppt/slides/slide24.xml><?xml version="1.0" encoding="utf-8"?>
+<p:sld xmlns:a="http://schemas.openxmlformats.org/drawingml/2006/main" xmlns:r="http://schemas.openxmlformats.org/officeDocument/2006/relationships" xmlns:p="http://schemas.openxmlformats.org/presentationml/2006/main">
+  <p:cSld>
+    <p:spTree>
+      <p:nvGrpSpPr>
+        <p:cNvPr id="1" name=""/>
+        <p:cNvGrpSpPr/>
+        <p:nvPr/>
+      </p:nvGrpSpPr>
+      <p:grpSpPr>
+        <a:xfrm>
+          <a:off x="0" y="0"/>
+          <a:ext cx="0" cy="0"/>
+          <a:chOff x="0" y="0"/>
+          <a:chExt cx="0" cy="0"/>
+        </a:xfrm>
+      </p:grpSpPr>
+      <p:sp>
+        <p:nvSpPr>
+          <p:cNvPr id="4" name="Date Placeholder 3"/>
+          <p:cNvSpPr>
+            <a:spLocks noGrp="1"/>
+          </p:cNvSpPr>
+          <p:nvPr>
+            <p:ph type="dt" sz="half" idx="10"/>
+          </p:nvPr>
+        </p:nvSpPr>
+        <p:spPr/>
+        <p:txBody>
+          <a:bodyPr/>
+          <a:lstStyle/>
+          <a:p>
+            <a:r>
+              <a:rPr lang="en-US" smtClean="0"/>
+              <a:t>12/28/2016</a:t>
+            </a:r>
+            <a:endParaRPr lang="en-US"/>
+          </a:p>
+        </p:txBody>
+      </p:sp>
+      <p:sp>
+        <p:nvSpPr>
+          <p:cNvPr id="2" name="Rectangle 1"/>
+          <p:cNvSpPr/>
+          <p:nvPr/>
+        </p:nvSpPr>
+        <p:spPr>
+          <a:xfrm>
+            <a:off x="467544" y="332656"/>
+            <a:ext cx="3960440" cy="369332"/>
+          </a:xfrm>
+          <a:prstGeom prst="rect">
+            <a:avLst/>
+          </a:prstGeom>
+        </p:spPr>
+        <p:txBody>
+          <a:bodyPr wrap="square">
+            <a:spAutoFit/>
+          </a:bodyPr>
+          <a:lstStyle/>
+          <a:p>
+            <a:pPr marL="285750" lvl="0" indent="-285750">
+              <a:buFont typeface="Arial" panose="020B0604020202020204" pitchFamily="34" charset="0"/>
+              <a:buChar char="•"/>
+            </a:pPr>
+            <a:r>
+              <a:rPr lang="en-US" dirty="0">
+                <a:solidFill>
+                  <a:schemeClr val="accent3">
+                    <a:lumMod val="50000"/>
+                  </a:schemeClr>
+                </a:solidFill>
+              </a:rPr>
+              <a:t>Part </a:t>
+            </a:r>
+            <a:r>
+              <a:rPr lang="en-US" dirty="0">
+                <a:solidFill>
+                  <a:schemeClr val="accent3">
+                    <a:lumMod val="50000"/>
+                  </a:schemeClr>
+                </a:solidFill>
+              </a:rPr>
+              <a:t>II: A Binary Tree Implementation</a:t>
+            </a:r>
+            <a:endParaRPr lang="en-US" dirty="0">
+              <a:solidFill>
+                <a:schemeClr val="accent3">
+                  <a:lumMod val="50000"/>
+                </a:schemeClr>
+              </a:solidFill>
+            </a:endParaRPr>
+          </a:p>
+        </p:txBody>
+      </p:sp>
+      <p:pic>
+        <p:nvPicPr>
+          <p:cNvPr id="5122" name="Picture 2"/>
+          <p:cNvPicPr>
+            <a:picLocks noChangeAspect="1" noChangeArrowheads="1"/>
+          </p:cNvPicPr>
+          <p:nvPr/>
+        </p:nvPicPr>
+        <p:blipFill>
+          <a:blip r:embed="rId3">
+            <a:extLst>
+              <a:ext uri="{28A0092B-C50C-407E-A947-70E740481C1C}">
+                <a14:useLocalDpi xmlns:a14="http://schemas.microsoft.com/office/drawing/2010/main" val="0"/>
+              </a:ext>
+            </a:extLst>
+          </a:blip>
+          <a:srcRect/>
+          <a:stretch>
+            <a:fillRect/>
+          </a:stretch>
+        </p:blipFill>
+        <p:spPr bwMode="auto">
+          <a:xfrm>
+            <a:off x="455857" y="1340768"/>
+            <a:ext cx="8352928" cy="4505783"/>
+          </a:xfrm>
+          <a:prstGeom prst="rect">
+            <a:avLst/>
+          </a:prstGeom>
+          <a:noFill/>
+          <a:ln>
+            <a:noFill/>
+          </a:ln>
+          <a:extLst>
+            <a:ext uri="{909E8E84-426E-40DD-AFC4-6F175D3DCCD1}">
+              <a14:hiddenFill xmlns:a14="http://schemas.microsoft.com/office/drawing/2010/main">
+                <a:solidFill>
+                  <a:schemeClr val="accent1"/>
+                </a:solidFill>
+              </a14:hiddenFill>
+            </a:ext>
+            <a:ext uri="{91240B29-F687-4F45-9708-019B960494DF}">
+              <a14:hiddenLine xmlns:a14="http://schemas.microsoft.com/office/drawing/2010/main" w="9525">
+                <a:solidFill>
+                  <a:schemeClr val="tx1"/>
+                </a:solidFill>
+                <a:miter lim="800000"/>
+                <a:headEnd/>
+                <a:tailEnd/>
+              </a14:hiddenLine>
+            </a:ext>
+          </a:extLst>
+        </p:spPr>
+      </p:pic>
+    </p:spTree>
+    <p:extLst>
+      <p:ext uri="{BB962C8B-B14F-4D97-AF65-F5344CB8AC3E}">
+        <p14:creationId xmlns:p14="http://schemas.microsoft.com/office/powerpoint/2010/main" val="1273156192"/>
+      </p:ext>
+    </p:extLst>
+  </p:cSld>
+  <p:clrMapOvr>
+    <a:masterClrMapping/>
+  </p:clrMapOvr>
+  <p:timing>
+    <p:tnLst>
+      <p:par>
+        <p:cTn id="1" dur="indefinite" restart="never" nodeType="tmRoot"/>
+      </p:par>
+    </p:tnLst>
+  </p:timing>
+</p:sld>
+</file>
+
+<file path=ppt/slides/slide25.xml><?xml version="1.0" encoding="utf-8"?>
+<p:sld xmlns:a="http://schemas.openxmlformats.org/drawingml/2006/main" xmlns:r="http://schemas.openxmlformats.org/officeDocument/2006/relationships" xmlns:p="http://schemas.openxmlformats.org/presentationml/2006/main">
+  <p:cSld>
+    <p:spTree>
+      <p:nvGrpSpPr>
+        <p:cNvPr id="1" name=""/>
+        <p:cNvGrpSpPr/>
+        <p:nvPr/>
+      </p:nvGrpSpPr>
+      <p:grpSpPr>
+        <a:xfrm>
+          <a:off x="0" y="0"/>
+          <a:ext cx="0" cy="0"/>
+          <a:chOff x="0" y="0"/>
+          <a:chExt cx="0" cy="0"/>
+        </a:xfrm>
+      </p:grpSpPr>
+      <p:sp>
+        <p:nvSpPr>
+          <p:cNvPr id="4" name="Date Placeholder 3"/>
+          <p:cNvSpPr>
+            <a:spLocks noGrp="1"/>
+          </p:cNvSpPr>
+          <p:nvPr>
+            <p:ph type="dt" sz="half" idx="10"/>
+          </p:nvPr>
+        </p:nvSpPr>
+        <p:spPr/>
+        <p:txBody>
+          <a:bodyPr/>
+          <a:lstStyle/>
+          <a:p>
+            <a:r>
+              <a:rPr lang="en-US" smtClean="0"/>
+              <a:t>12/28/2016</a:t>
+            </a:r>
+            <a:endParaRPr lang="en-US"/>
+          </a:p>
+        </p:txBody>
+      </p:sp>
+      <p:pic>
+        <p:nvPicPr>
+          <p:cNvPr id="6150" name="Picture 6" descr="http://thumbs.dreamstime.com/x/thank-you-written-beach-21304422.jpg"/>
+          <p:cNvPicPr>
+            <a:picLocks noChangeAspect="1" noChangeArrowheads="1"/>
+          </p:cNvPicPr>
+          <p:nvPr/>
+        </p:nvPicPr>
+        <p:blipFill>
+          <a:blip r:embed="rId3">
+            <a:extLst>
+              <a:ext uri="{28A0092B-C50C-407E-A947-70E740481C1C}">
+                <a14:useLocalDpi xmlns:a14="http://schemas.microsoft.com/office/drawing/2010/main" val="0"/>
+              </a:ext>
+            </a:extLst>
+          </a:blip>
+          <a:srcRect/>
+          <a:stretch>
+            <a:fillRect/>
+          </a:stretch>
+        </p:blipFill>
+        <p:spPr bwMode="auto">
+          <a:xfrm>
+            <a:off x="611560" y="476672"/>
+            <a:ext cx="2804806" cy="1872208"/>
+          </a:xfrm>
+          <a:prstGeom prst="rect">
+            <a:avLst/>
+          </a:prstGeom>
+          <a:noFill/>
+          <a:extLst>
+            <a:ext uri="{909E8E84-426E-40DD-AFC4-6F175D3DCCD1}">
+              <a14:hiddenFill xmlns:a14="http://schemas.microsoft.com/office/drawing/2010/main">
+                <a:solidFill>
+                  <a:srgbClr val="FFFFFF"/>
+                </a:solidFill>
+              </a14:hiddenFill>
+            </a:ext>
+          </a:extLst>
+        </p:spPr>
+      </p:pic>
+      <p:pic>
+        <p:nvPicPr>
+          <p:cNvPr id="8" name="Picture 2" descr="http://i.huffpost.com/gen/2774246/images/n-ASKING-QUESTIONS-628x314.jpg"/>
+          <p:cNvPicPr>
+            <a:picLocks noChangeAspect="1" noChangeArrowheads="1"/>
+          </p:cNvPicPr>
+          <p:nvPr/>
+        </p:nvPicPr>
+        <p:blipFill>
+          <a:blip r:embed="rId4">
+            <a:extLst>
+              <a:ext uri="{28A0092B-C50C-407E-A947-70E740481C1C}">
+                <a14:useLocalDpi xmlns:a14="http://schemas.microsoft.com/office/drawing/2010/main" val="0"/>
+              </a:ext>
+            </a:extLst>
+          </a:blip>
+          <a:srcRect/>
+          <a:stretch>
+            <a:fillRect/>
+          </a:stretch>
+        </p:blipFill>
+        <p:spPr bwMode="auto">
+          <a:xfrm>
+            <a:off x="2013963" y="2764656"/>
+            <a:ext cx="5981700" cy="2990850"/>
+          </a:xfrm>
+          <a:prstGeom prst="rect">
+            <a:avLst/>
+          </a:prstGeom>
+          <a:noFill/>
+          <a:extLst>
+            <a:ext uri="{909E8E84-426E-40DD-AFC4-6F175D3DCCD1}">
+              <a14:hiddenFill xmlns:a14="http://schemas.microsoft.com/office/drawing/2010/main">
+                <a:solidFill>
+                  <a:srgbClr val="FFFFFF"/>
+                </a:solidFill>
+              </a14:hiddenFill>
+            </a:ext>
+          </a:extLst>
+        </p:spPr>
+      </p:pic>
+    </p:spTree>
+    <p:extLst>
+      <p:ext uri="{BB962C8B-B14F-4D97-AF65-F5344CB8AC3E}">
+        <p14:creationId xmlns:p14="http://schemas.microsoft.com/office/powerpoint/2010/main" val="915764241"/>
       </p:ext>
     </p:extLst>
   </p:cSld>
@@ -10794,7 +13121,9 @@
             <a:r>
               <a:rPr lang="en-US" dirty="0">
                 <a:solidFill>
-                  <a:prstClr val="black"/>
+                  <a:schemeClr val="accent3">
+                    <a:lumMod val="50000"/>
+                  </a:schemeClr>
                 </a:solidFill>
               </a:rPr>
               <a:t>Part </a:t>
@@ -10802,14 +13131,18 @@
             <a:r>
               <a:rPr lang="en-US" dirty="0" smtClean="0">
                 <a:solidFill>
-                  <a:prstClr val="black"/>
+                  <a:schemeClr val="accent3">
+                    <a:lumMod val="50000"/>
+                  </a:schemeClr>
                 </a:solidFill>
               </a:rPr>
               <a:t>I: What is a Binary Tree</a:t>
             </a:r>
             <a:endParaRPr lang="en-US" dirty="0">
               <a:solidFill>
-                <a:prstClr val="black"/>
+                <a:schemeClr val="accent3">
+                  <a:lumMod val="50000"/>
+                </a:schemeClr>
               </a:solidFill>
             </a:endParaRPr>
           </a:p>
@@ -10838,8 +13171,18 @@
           <a:lstStyle/>
           <a:p>
             <a:r>
+              <a:rPr lang="en-US" dirty="0" smtClean="0">
+                <a:solidFill>
+                  <a:schemeClr val="accent3">
+                    <a:lumMod val="50000"/>
+                  </a:schemeClr>
+                </a:solidFill>
+              </a:rPr>
+              <a:t>A Binary Tree is first of all a TREE</a:t>
+            </a:r>
+            <a:r>
               <a:rPr lang="en-US" dirty="0" smtClean="0"/>
-              <a:t>A Binary Tree is first of all a TREE </a:t>
+              <a:t> </a:t>
             </a:r>
             <a:endParaRPr lang="en-US" dirty="0"/>
           </a:p>
@@ -11082,7 +13425,9 @@
             <a:r>
               <a:rPr lang="en-US" dirty="0">
                 <a:solidFill>
-                  <a:prstClr val="black"/>
+                  <a:schemeClr val="accent3">
+                    <a:lumMod val="50000"/>
+                  </a:schemeClr>
                 </a:solidFill>
               </a:rPr>
               <a:t>Part </a:t>
@@ -11090,14 +13435,18 @@
             <a:r>
               <a:rPr lang="en-US" dirty="0" smtClean="0">
                 <a:solidFill>
-                  <a:prstClr val="black"/>
+                  <a:schemeClr val="accent3">
+                    <a:lumMod val="50000"/>
+                  </a:schemeClr>
                 </a:solidFill>
               </a:rPr>
               <a:t>I: What is a Binary Tree</a:t>
             </a:r>
             <a:endParaRPr lang="en-US" dirty="0">
               <a:solidFill>
-                <a:prstClr val="black"/>
+                <a:schemeClr val="accent3">
+                  <a:lumMod val="50000"/>
+                </a:schemeClr>
               </a:solidFill>
             </a:endParaRPr>
           </a:p>
@@ -11126,10 +13475,22 @@
           <a:lstStyle/>
           <a:p>
             <a:r>
-              <a:rPr lang="en-US" dirty="0" smtClean="0"/>
+              <a:rPr lang="en-US" dirty="0" smtClean="0">
+                <a:solidFill>
+                  <a:schemeClr val="accent3">
+                    <a:lumMod val="50000"/>
+                  </a:schemeClr>
+                </a:solidFill>
+              </a:rPr>
               <a:t>A Binary Tree is first of all a TREE </a:t>
             </a:r>
-            <a:endParaRPr lang="en-US" dirty="0"/>
+            <a:endParaRPr lang="en-US" dirty="0">
+              <a:solidFill>
+                <a:schemeClr val="accent3">
+                  <a:lumMod val="50000"/>
+                </a:schemeClr>
+              </a:solidFill>
+            </a:endParaRPr>
           </a:p>
         </p:txBody>
       </p:sp>
@@ -11411,7 +13772,9 @@
             <a:r>
               <a:rPr lang="en-US" dirty="0">
                 <a:solidFill>
-                  <a:prstClr val="black"/>
+                  <a:schemeClr val="accent3">
+                    <a:lumMod val="50000"/>
+                  </a:schemeClr>
                 </a:solidFill>
               </a:rPr>
               <a:t>Part </a:t>
@@ -11419,14 +13782,18 @@
             <a:r>
               <a:rPr lang="en-US" dirty="0" smtClean="0">
                 <a:solidFill>
-                  <a:prstClr val="black"/>
+                  <a:schemeClr val="accent3">
+                    <a:lumMod val="50000"/>
+                  </a:schemeClr>
                 </a:solidFill>
               </a:rPr>
               <a:t>I: What is a Binary Tree</a:t>
             </a:r>
             <a:endParaRPr lang="en-US" dirty="0">
               <a:solidFill>
-                <a:prstClr val="black"/>
+                <a:schemeClr val="accent3">
+                  <a:lumMod val="50000"/>
+                </a:schemeClr>
               </a:solidFill>
             </a:endParaRPr>
           </a:p>
@@ -11455,8 +13822,18 @@
           <a:lstStyle/>
           <a:p>
             <a:r>
+              <a:rPr lang="en-US" dirty="0" smtClean="0">
+                <a:solidFill>
+                  <a:schemeClr val="accent3">
+                    <a:lumMod val="50000"/>
+                  </a:schemeClr>
+                </a:solidFill>
+              </a:rPr>
+              <a:t>A Binary Tree is first of all a TREE</a:t>
+            </a:r>
+            <a:r>
               <a:rPr lang="en-US" dirty="0" smtClean="0"/>
-              <a:t>A Binary Tree is first of all a TREE </a:t>
+              <a:t> </a:t>
             </a:r>
             <a:endParaRPr lang="en-US" dirty="0"/>
           </a:p>

</xml_diff>

<commit_message>
update ppt after renaming classese
</commit_message>
<xml_diff>
--- a/resource/Introduction to Binary Tree.pptx
+++ b/resource/Introduction to Binary Tree.pptx
@@ -223,7 +223,7 @@
           <a:p>
             <a:fld id="{480DA8E0-25EB-402D-BB5B-DCCDCE76F9A5}" type="datetimeFigureOut">
               <a:rPr lang="en-US" smtClean="0"/>
-              <a:t>1/1/2017</a:t>
+              <a:t>1/3/2017</a:t>
             </a:fld>
             <a:endParaRPr lang="en-US"/>
           </a:p>
@@ -397,7 +397,7 @@
           <a:p>
             <a:fld id="{7A58D1A1-2380-4093-9EDA-11CCE957546C}" type="datetimeFigureOut">
               <a:rPr lang="en-US" smtClean="0"/>
-              <a:t>1/1/2017</a:t>
+              <a:t>1/3/2017</a:t>
             </a:fld>
             <a:endParaRPr lang="en-US"/>
           </a:p>
@@ -743,7 +743,7 @@
           <a:p>
             <a:fld id="{BA75FA03-E652-4B64-A887-21198C1004CB}" type="datetime1">
               <a:rPr lang="en-US" smtClean="0"/>
-              <a:t>1/1/2017</a:t>
+              <a:t>1/3/2017</a:t>
             </a:fld>
             <a:endParaRPr lang="en-US"/>
           </a:p>
@@ -881,7 +881,7 @@
           <a:p>
             <a:fld id="{8064C587-9BD5-4FA3-9B48-B80D473A78ED}" type="datetime1">
               <a:rPr lang="en-US" smtClean="0"/>
-              <a:t>1/1/2017</a:t>
+              <a:t>1/3/2017</a:t>
             </a:fld>
             <a:endParaRPr lang="en-US"/>
           </a:p>
@@ -1019,7 +1019,7 @@
           <a:p>
             <a:fld id="{8064C587-9BD5-4FA3-9B48-B80D473A78ED}" type="datetime1">
               <a:rPr lang="en-US" smtClean="0"/>
-              <a:t>1/1/2017</a:t>
+              <a:t>1/3/2017</a:t>
             </a:fld>
             <a:endParaRPr lang="en-US"/>
           </a:p>
@@ -1157,7 +1157,7 @@
           <a:p>
             <a:fld id="{8064C587-9BD5-4FA3-9B48-B80D473A78ED}" type="datetime1">
               <a:rPr lang="en-US" smtClean="0"/>
-              <a:t>1/1/2017</a:t>
+              <a:t>1/3/2017</a:t>
             </a:fld>
             <a:endParaRPr lang="en-US"/>
           </a:p>
@@ -1295,7 +1295,7 @@
           <a:p>
             <a:fld id="{8064C587-9BD5-4FA3-9B48-B80D473A78ED}" type="datetime1">
               <a:rPr lang="en-US" smtClean="0"/>
-              <a:t>1/1/2017</a:t>
+              <a:t>1/3/2017</a:t>
             </a:fld>
             <a:endParaRPr lang="en-US"/>
           </a:p>
@@ -1433,7 +1433,7 @@
           <a:p>
             <a:fld id="{8064C587-9BD5-4FA3-9B48-B80D473A78ED}" type="datetime1">
               <a:rPr lang="en-US" smtClean="0"/>
-              <a:t>1/1/2017</a:t>
+              <a:t>1/3/2017</a:t>
             </a:fld>
             <a:endParaRPr lang="en-US"/>
           </a:p>
@@ -1587,7 +1587,7 @@
           <a:p>
             <a:fld id="{8064C587-9BD5-4FA3-9B48-B80D473A78ED}" type="datetime1">
               <a:rPr lang="en-US" smtClean="0"/>
-              <a:t>1/1/2017</a:t>
+              <a:t>1/3/2017</a:t>
             </a:fld>
             <a:endParaRPr lang="en-US"/>
           </a:p>
@@ -1717,7 +1717,7 @@
           <a:p>
             <a:fld id="{8064C587-9BD5-4FA3-9B48-B80D473A78ED}" type="datetime1">
               <a:rPr lang="en-US" smtClean="0"/>
-              <a:t>1/1/2017</a:t>
+              <a:t>1/3/2017</a:t>
             </a:fld>
             <a:endParaRPr lang="en-US"/>
           </a:p>
@@ -1859,7 +1859,7 @@
           <a:p>
             <a:fld id="{8064C587-9BD5-4FA3-9B48-B80D473A78ED}" type="datetime1">
               <a:rPr lang="en-US" smtClean="0"/>
-              <a:t>1/1/2017</a:t>
+              <a:t>1/3/2017</a:t>
             </a:fld>
             <a:endParaRPr lang="en-US"/>
           </a:p>
@@ -2011,7 +2011,7 @@
           <a:p>
             <a:fld id="{8064C587-9BD5-4FA3-9B48-B80D473A78ED}" type="datetime1">
               <a:rPr lang="en-US" smtClean="0"/>
-              <a:t>1/1/2017</a:t>
+              <a:t>1/3/2017</a:t>
             </a:fld>
             <a:endParaRPr lang="en-US"/>
           </a:p>
@@ -2163,7 +2163,7 @@
           <a:p>
             <a:fld id="{8064C587-9BD5-4FA3-9B48-B80D473A78ED}" type="datetime1">
               <a:rPr lang="en-US" smtClean="0"/>
-              <a:t>1/1/2017</a:t>
+              <a:t>1/3/2017</a:t>
             </a:fld>
             <a:endParaRPr lang="en-US"/>
           </a:p>
@@ -2301,7 +2301,7 @@
           <a:p>
             <a:fld id="{8064C587-9BD5-4FA3-9B48-B80D473A78ED}" type="datetime1">
               <a:rPr lang="en-US" smtClean="0"/>
-              <a:t>1/1/2017</a:t>
+              <a:t>1/3/2017</a:t>
             </a:fld>
             <a:endParaRPr lang="en-US"/>
           </a:p>
@@ -2453,7 +2453,7 @@
           <a:p>
             <a:fld id="{8064C587-9BD5-4FA3-9B48-B80D473A78ED}" type="datetime1">
               <a:rPr lang="en-US" smtClean="0"/>
-              <a:t>1/1/2017</a:t>
+              <a:t>1/3/2017</a:t>
             </a:fld>
             <a:endParaRPr lang="en-US"/>
           </a:p>
@@ -2605,7 +2605,7 @@
           <a:p>
             <a:fld id="{8064C587-9BD5-4FA3-9B48-B80D473A78ED}" type="datetime1">
               <a:rPr lang="en-US" smtClean="0"/>
-              <a:t>1/1/2017</a:t>
+              <a:t>1/3/2017</a:t>
             </a:fld>
             <a:endParaRPr lang="en-US"/>
           </a:p>
@@ -2757,7 +2757,7 @@
           <a:p>
             <a:fld id="{8064C587-9BD5-4FA3-9B48-B80D473A78ED}" type="datetime1">
               <a:rPr lang="en-US" smtClean="0"/>
-              <a:t>1/1/2017</a:t>
+              <a:t>1/3/2017</a:t>
             </a:fld>
             <a:endParaRPr lang="en-US"/>
           </a:p>
@@ -2909,7 +2909,7 @@
           <a:p>
             <a:fld id="{8064C587-9BD5-4FA3-9B48-B80D473A78ED}" type="datetime1">
               <a:rPr lang="en-US" smtClean="0"/>
-              <a:t>1/1/2017</a:t>
+              <a:t>1/3/2017</a:t>
             </a:fld>
             <a:endParaRPr lang="en-US"/>
           </a:p>
@@ -3061,7 +3061,7 @@
           <a:p>
             <a:fld id="{8064C587-9BD5-4FA3-9B48-B80D473A78ED}" type="datetime1">
               <a:rPr lang="en-US" smtClean="0"/>
-              <a:t>1/1/2017</a:t>
+              <a:t>1/3/2017</a:t>
             </a:fld>
             <a:endParaRPr lang="en-US"/>
           </a:p>
@@ -3213,7 +3213,7 @@
           <a:p>
             <a:fld id="{8064C587-9BD5-4FA3-9B48-B80D473A78ED}" type="datetime1">
               <a:rPr lang="en-US" smtClean="0"/>
-              <a:t>1/1/2017</a:t>
+              <a:t>1/3/2017</a:t>
             </a:fld>
             <a:endParaRPr lang="en-US"/>
           </a:p>
@@ -3359,7 +3359,7 @@
           <a:p>
             <a:fld id="{8064C587-9BD5-4FA3-9B48-B80D473A78ED}" type="datetime1">
               <a:rPr lang="en-US" smtClean="0"/>
-              <a:t>1/1/2017</a:t>
+              <a:t>1/3/2017</a:t>
             </a:fld>
             <a:endParaRPr lang="en-US"/>
           </a:p>
@@ -3497,7 +3497,7 @@
           <a:p>
             <a:fld id="{8064C587-9BD5-4FA3-9B48-B80D473A78ED}" type="datetime1">
               <a:rPr lang="en-US" smtClean="0"/>
-              <a:t>1/1/2017</a:t>
+              <a:t>1/3/2017</a:t>
             </a:fld>
             <a:endParaRPr lang="en-US"/>
           </a:p>
@@ -3635,7 +3635,7 @@
           <a:p>
             <a:fld id="{8064C587-9BD5-4FA3-9B48-B80D473A78ED}" type="datetime1">
               <a:rPr lang="en-US" smtClean="0"/>
-              <a:t>1/1/2017</a:t>
+              <a:t>1/3/2017</a:t>
             </a:fld>
             <a:endParaRPr lang="en-US"/>
           </a:p>
@@ -3773,7 +3773,7 @@
           <a:p>
             <a:fld id="{8064C587-9BD5-4FA3-9B48-B80D473A78ED}" type="datetime1">
               <a:rPr lang="en-US" smtClean="0"/>
-              <a:t>1/1/2017</a:t>
+              <a:t>1/3/2017</a:t>
             </a:fld>
             <a:endParaRPr lang="en-US"/>
           </a:p>
@@ -3911,7 +3911,7 @@
           <a:p>
             <a:fld id="{8064C587-9BD5-4FA3-9B48-B80D473A78ED}" type="datetime1">
               <a:rPr lang="en-US" smtClean="0"/>
-              <a:t>1/1/2017</a:t>
+              <a:t>1/3/2017</a:t>
             </a:fld>
             <a:endParaRPr lang="en-US"/>
           </a:p>
@@ -4049,7 +4049,7 @@
           <a:p>
             <a:fld id="{8064C587-9BD5-4FA3-9B48-B80D473A78ED}" type="datetime1">
               <a:rPr lang="en-US" smtClean="0"/>
-              <a:t>1/1/2017</a:t>
+              <a:t>1/3/2017</a:t>
             </a:fld>
             <a:endParaRPr lang="en-US"/>
           </a:p>
@@ -4183,7 +4183,7 @@
           <a:p>
             <a:fld id="{8064C587-9BD5-4FA3-9B48-B80D473A78ED}" type="datetime1">
               <a:rPr lang="en-US" smtClean="0"/>
-              <a:t>1/1/2017</a:t>
+              <a:t>1/3/2017</a:t>
             </a:fld>
             <a:endParaRPr lang="en-US"/>
           </a:p>
@@ -10166,11 +10166,7 @@
             </a:r>
             <a:r>
               <a:rPr lang="en-US" sz="1400" dirty="0" smtClean="0"/>
-              <a:t>left, right</a:t>
-            </a:r>
-            <a:r>
-              <a:rPr lang="en-US" sz="1400" dirty="0" smtClean="0"/>
-              <a:t>) : 9-&gt;4-&gt;3-&gt;6-&gt;5-&gt;7-&gt;17-&gt;22-&gt;20</a:t>
+              <a:t>left, right) : 9-&gt;4-&gt;3-&gt;6-&gt;5-&gt;7-&gt;17-&gt;22-&gt;20</a:t>
             </a:r>
             <a:endParaRPr lang="en-US" sz="1400" dirty="0"/>
           </a:p>
@@ -10187,7 +10183,6 @@
               <a:rPr lang="en-US" sz="1400" dirty="0" smtClean="0"/>
               <a:t>): 3-&gt;5-&gt;7-&gt;6-&gt;4-&gt;20-&gt;22-&gt;17-&gt;9</a:t>
             </a:r>
-            <a:endParaRPr lang="en-US" sz="1400" dirty="0" smtClean="0"/>
           </a:p>
           <a:p>
             <a:pPr marL="1200150" lvl="2" indent="-285750" fontAlgn="t">
@@ -10548,11 +10543,7 @@
             </a:pPr>
             <a:r>
               <a:rPr lang="en-US" sz="1600" dirty="0" smtClean="0"/>
-              <a:t>A Binary Sear</a:t>
-            </a:r>
-            <a:r>
-              <a:rPr lang="en-US" sz="1600" dirty="0" smtClean="0"/>
-              <a:t>ch Tree is such a binary tree that </a:t>
+              <a:t>A Binary Search Tree is such a binary tree that </a:t>
             </a:r>
           </a:p>
           <a:p>
@@ -10944,25 +10935,8 @@
                   </a:schemeClr>
                 </a:solidFill>
               </a:rPr>
-              <a:t>Part </a:t>
-            </a:r>
-            <a:r>
-              <a:rPr lang="en-US" dirty="0">
-                <a:solidFill>
-                  <a:schemeClr val="accent3">
-                    <a:lumMod val="50000"/>
-                  </a:schemeClr>
-                </a:solidFill>
-              </a:rPr>
-              <a:t>II: A Binary Tree Implementation</a:t>
-            </a:r>
-            <a:endParaRPr lang="en-US" dirty="0">
-              <a:solidFill>
-                <a:schemeClr val="accent3">
-                  <a:lumMod val="50000"/>
-                </a:schemeClr>
-              </a:solidFill>
-            </a:endParaRPr>
+              <a:t>Part II: A Binary Tree Implementation</a:t>
+            </a:r>
           </a:p>
         </p:txBody>
       </p:sp>
@@ -11225,31 +11199,14 @@
                   </a:schemeClr>
                 </a:solidFill>
               </a:rPr>
-              <a:t>Part </a:t>
-            </a:r>
-            <a:r>
-              <a:rPr lang="en-US" dirty="0">
-                <a:solidFill>
-                  <a:schemeClr val="accent3">
-                    <a:lumMod val="50000"/>
-                  </a:schemeClr>
-                </a:solidFill>
-              </a:rPr>
-              <a:t>II: A Binary Tree Implementation</a:t>
-            </a:r>
-            <a:endParaRPr lang="en-US" dirty="0">
-              <a:solidFill>
-                <a:schemeClr val="accent3">
-                  <a:lumMod val="50000"/>
-                </a:schemeClr>
-              </a:solidFill>
-            </a:endParaRPr>
+              <a:t>Part II: A Binary Tree Implementation</a:t>
+            </a:r>
           </a:p>
         </p:txBody>
       </p:sp>
       <p:pic>
         <p:nvPicPr>
-          <p:cNvPr id="2051" name="Picture 3"/>
+          <p:cNvPr id="1026" name="Picture 2"/>
           <p:cNvPicPr>
             <a:picLocks noChangeAspect="1" noChangeArrowheads="1"/>
           </p:cNvPicPr>
@@ -11270,8 +11227,8 @@
         </p:blipFill>
         <p:spPr bwMode="auto">
           <a:xfrm>
-            <a:off x="933515" y="727353"/>
-            <a:ext cx="7272808" cy="5966898"/>
+            <a:off x="899592" y="674773"/>
+            <a:ext cx="7229475" cy="5905500"/>
           </a:xfrm>
           <a:prstGeom prst="rect">
             <a:avLst/>
@@ -11394,31 +11351,14 @@
                   </a:schemeClr>
                 </a:solidFill>
               </a:rPr>
-              <a:t>Part </a:t>
-            </a:r>
-            <a:r>
-              <a:rPr lang="en-US" dirty="0">
-                <a:solidFill>
-                  <a:schemeClr val="accent3">
-                    <a:lumMod val="50000"/>
-                  </a:schemeClr>
-                </a:solidFill>
-              </a:rPr>
-              <a:t>II: A Binary Tree Implementation</a:t>
-            </a:r>
-            <a:endParaRPr lang="en-US" dirty="0">
-              <a:solidFill>
-                <a:schemeClr val="accent3">
-                  <a:lumMod val="50000"/>
-                </a:schemeClr>
-              </a:solidFill>
-            </a:endParaRPr>
+              <a:t>Part II: A Binary Tree Implementation</a:t>
+            </a:r>
           </a:p>
         </p:txBody>
       </p:sp>
       <p:pic>
         <p:nvPicPr>
-          <p:cNvPr id="3076" name="Picture 4"/>
+          <p:cNvPr id="3079" name="Picture 7"/>
           <p:cNvPicPr>
             <a:picLocks noChangeAspect="1" noChangeArrowheads="1"/>
           </p:cNvPicPr>
@@ -11439,8 +11379,8 @@
         </p:blipFill>
         <p:spPr bwMode="auto">
           <a:xfrm>
-            <a:off x="553894" y="836712"/>
-            <a:ext cx="7800975" cy="5610225"/>
+            <a:off x="6012160" y="3933056"/>
+            <a:ext cx="2124075" cy="1943100"/>
           </a:xfrm>
           <a:prstGeom prst="rect">
             <a:avLst/>
@@ -11472,7 +11412,7 @@
       </p:pic>
       <p:pic>
         <p:nvPicPr>
-          <p:cNvPr id="3079" name="Picture 7"/>
+          <p:cNvPr id="2050" name="Picture 2"/>
           <p:cNvPicPr>
             <a:picLocks noChangeAspect="1" noChangeArrowheads="1"/>
           </p:cNvPicPr>
@@ -11493,8 +11433,8 @@
         </p:blipFill>
         <p:spPr bwMode="auto">
           <a:xfrm>
-            <a:off x="6012160" y="3933056"/>
-            <a:ext cx="2124075" cy="1943100"/>
+            <a:off x="323528" y="701988"/>
+            <a:ext cx="8641659" cy="5661247"/>
           </a:xfrm>
           <a:prstGeom prst="rect">
             <a:avLst/>
@@ -11563,7 +11503,7 @@
       </p:grpSpPr>
       <p:pic>
         <p:nvPicPr>
-          <p:cNvPr id="4104" name="Picture 8"/>
+          <p:cNvPr id="3074" name="Picture 2"/>
           <p:cNvPicPr>
             <a:picLocks noChangeAspect="1" noChangeArrowheads="1"/>
           </p:cNvPicPr>
@@ -11584,8 +11524,8 @@
         </p:blipFill>
         <p:spPr bwMode="auto">
           <a:xfrm>
-            <a:off x="251520" y="737313"/>
-            <a:ext cx="6595607" cy="5917112"/>
+            <a:off x="501080" y="671507"/>
+            <a:ext cx="7193364" cy="5847450"/>
           </a:xfrm>
           <a:prstGeom prst="rect">
             <a:avLst/>
@@ -11671,25 +11611,8 @@
                   </a:schemeClr>
                 </a:solidFill>
               </a:rPr>
-              <a:t>Part </a:t>
-            </a:r>
-            <a:r>
-              <a:rPr lang="en-US" dirty="0">
-                <a:solidFill>
-                  <a:schemeClr val="accent3">
-                    <a:lumMod val="50000"/>
-                  </a:schemeClr>
-                </a:solidFill>
-              </a:rPr>
-              <a:t>II: A Binary Tree Implementation</a:t>
-            </a:r>
-            <a:endParaRPr lang="en-US" dirty="0">
-              <a:solidFill>
-                <a:schemeClr val="accent3">
-                  <a:lumMod val="50000"/>
-                </a:schemeClr>
-              </a:solidFill>
-            </a:endParaRPr>
+              <a:t>Part II: A Binary Tree Implementation</a:t>
+            </a:r>
           </a:p>
         </p:txBody>
       </p:sp>
@@ -11716,7 +11639,7 @@
         </p:blipFill>
         <p:spPr bwMode="auto">
           <a:xfrm>
-            <a:off x="5761390" y="701988"/>
+            <a:off x="5761390" y="1268760"/>
             <a:ext cx="1876797" cy="2145950"/>
           </a:xfrm>
           <a:prstGeom prst="rect">
@@ -11770,7 +11693,7 @@
         </p:blipFill>
         <p:spPr bwMode="auto">
           <a:xfrm>
-            <a:off x="4211960" y="2420888"/>
+            <a:off x="4644008" y="3356992"/>
             <a:ext cx="1757611" cy="2189810"/>
           </a:xfrm>
           <a:prstGeom prst="rect">
@@ -11824,7 +11747,7 @@
         </p:blipFill>
         <p:spPr bwMode="auto">
           <a:xfrm>
-            <a:off x="6444208" y="3028462"/>
+            <a:off x="6481930" y="3328423"/>
             <a:ext cx="2152097" cy="2117801"/>
           </a:xfrm>
           <a:prstGeom prst="rect">
@@ -11948,25 +11871,8 @@
                   </a:schemeClr>
                 </a:solidFill>
               </a:rPr>
-              <a:t>Part </a:t>
-            </a:r>
-            <a:r>
-              <a:rPr lang="en-US" dirty="0">
-                <a:solidFill>
-                  <a:schemeClr val="accent3">
-                    <a:lumMod val="50000"/>
-                  </a:schemeClr>
-                </a:solidFill>
-              </a:rPr>
-              <a:t>II: A Binary Tree Implementation</a:t>
-            </a:r>
-            <a:endParaRPr lang="en-US" dirty="0">
-              <a:solidFill>
-                <a:schemeClr val="accent3">
-                  <a:lumMod val="50000"/>
-                </a:schemeClr>
-              </a:solidFill>
-            </a:endParaRPr>
+              <a:t>Part II: A Binary Tree Implementation</a:t>
+            </a:r>
           </a:p>
         </p:txBody>
       </p:sp>

</xml_diff>